<commit_message>
Alterada pptx 1 para que os alunos faça fork/alteração/commit/push/pull e alterado pptx5
</commit_message>
<xml_diff>
--- a/Controlando versões com Git e Github - Capítulo I.pptx
+++ b/Controlando versões com Git e Github - Capítulo I.pptx
@@ -6,13 +6,14 @@
   </p:sldMasterIdLst>
   <p:sldIdLst>
     <p:sldId id="256" r:id="rId2"/>
-    <p:sldId id="262" r:id="rId3"/>
+    <p:sldId id="264" r:id="rId3"/>
     <p:sldId id="257" r:id="rId4"/>
-    <p:sldId id="258" r:id="rId5"/>
-    <p:sldId id="259" r:id="rId6"/>
-    <p:sldId id="260" r:id="rId7"/>
-    <p:sldId id="261" r:id="rId8"/>
-    <p:sldId id="263" r:id="rId9"/>
+    <p:sldId id="265" r:id="rId5"/>
+    <p:sldId id="258" r:id="rId6"/>
+    <p:sldId id="259" r:id="rId7"/>
+    <p:sldId id="260" r:id="rId8"/>
+    <p:sldId id="261" r:id="rId9"/>
+    <p:sldId id="263" r:id="rId10"/>
   </p:sldIdLst>
   <p:sldSz cx="9144000" cy="6858000" type="screen4x3"/>
   <p:notesSz cx="6858000" cy="9144000"/>
@@ -283,7 +284,7 @@
             <a:fld id="{08B9EBBA-996F-894A-B54A-D6246ED52CEA}" type="datetimeFigureOut">
               <a:rPr lang="en-US" smtClean="0"/>
               <a:pPr/>
-              <a:t>9/23/2020</a:t>
+              <a:t>10/7/2020</a:t>
             </a:fld>
             <a:endParaRPr lang="en-US" dirty="0"/>
           </a:p>
@@ -455,7 +456,7 @@
             <a:fld id="{C6C52C72-DE31-F449-A4ED-4C594FD91407}" type="datetimeFigureOut">
               <a:rPr lang="en-US" smtClean="0"/>
               <a:pPr/>
-              <a:t>9/23/2020</a:t>
+              <a:t>10/7/2020</a:t>
             </a:fld>
             <a:endParaRPr lang="en-US" dirty="0"/>
           </a:p>
@@ -637,7 +638,7 @@
             <a:fld id="{ED62726E-379B-B349-9EED-81ED093FA806}" type="datetimeFigureOut">
               <a:rPr lang="en-US" smtClean="0"/>
               <a:pPr/>
-              <a:t>9/23/2020</a:t>
+              <a:t>10/7/2020</a:t>
             </a:fld>
             <a:endParaRPr lang="en-US" dirty="0"/>
           </a:p>
@@ -809,7 +810,7 @@
             <a:fld id="{9B3A1323-8D79-1946-B0D7-40001CF92E9D}" type="datetimeFigureOut">
               <a:rPr lang="en-US" smtClean="0"/>
               <a:pPr/>
-              <a:t>9/23/2020</a:t>
+              <a:t>10/7/2020</a:t>
             </a:fld>
             <a:endParaRPr lang="en-US" dirty="0"/>
           </a:p>
@@ -1079,7 +1080,7 @@
             <a:fld id="{8DFA1846-DA80-1C48-A609-854EA85C59AD}" type="datetimeFigureOut">
               <a:rPr lang="en-US" smtClean="0"/>
               <a:pPr/>
-              <a:t>9/23/2020</a:t>
+              <a:t>10/7/2020</a:t>
             </a:fld>
             <a:endParaRPr lang="en-US" dirty="0"/>
           </a:p>
@@ -1313,7 +1314,7 @@
             <a:fld id="{57302355-E14B-8545-A8F8-0FE83CC9D524}" type="datetimeFigureOut">
               <a:rPr lang="en-US" smtClean="0"/>
               <a:pPr/>
-              <a:t>9/23/2020</a:t>
+              <a:t>10/7/2020</a:t>
             </a:fld>
             <a:endParaRPr lang="en-US" dirty="0"/>
           </a:p>
@@ -1674,7 +1675,7 @@
             <a:fld id="{09B482E8-6E0E-1B4F-B1FD-C69DB9E858D9}" type="datetimeFigureOut">
               <a:rPr lang="en-US" smtClean="0"/>
               <a:pPr/>
-              <a:t>9/23/2020</a:t>
+              <a:t>10/7/2020</a:t>
             </a:fld>
             <a:endParaRPr lang="en-US" dirty="0"/>
           </a:p>
@@ -1818,7 +1819,7 @@
             <a:fld id="{F13A34C8-038E-2045-AF43-DF7DBB8E0E9E}" type="datetimeFigureOut">
               <a:rPr lang="en-US" smtClean="0"/>
               <a:pPr/>
-              <a:t>9/23/2020</a:t>
+              <a:t>10/7/2020</a:t>
             </a:fld>
             <a:endParaRPr lang="en-US" dirty="0"/>
           </a:p>
@@ -1915,7 +1916,7 @@
             <a:fld id="{8818C68F-D26B-8F47-958C-23B49CF8A634}" type="datetimeFigureOut">
               <a:rPr lang="en-US" smtClean="0"/>
               <a:pPr/>
-              <a:t>9/23/2020</a:t>
+              <a:t>10/7/2020</a:t>
             </a:fld>
             <a:endParaRPr lang="en-US" dirty="0"/>
           </a:p>
@@ -2274,7 +2275,7 @@
             <a:fld id="{D0DF5E60-9974-AC48-9591-99C2BB44B7CF}" type="datetimeFigureOut">
               <a:rPr lang="en-US" smtClean="0"/>
               <a:pPr/>
-              <a:t>9/23/2020</a:t>
+              <a:t>10/7/2020</a:t>
             </a:fld>
             <a:endParaRPr lang="en-US" dirty="0"/>
           </a:p>
@@ -2635,7 +2636,7 @@
             <a:fld id="{09B482E8-6E0E-1B4F-B1FD-C69DB9E858D9}" type="datetimeFigureOut">
               <a:rPr lang="en-US" smtClean="0"/>
               <a:pPr/>
-              <a:t>9/23/2020</a:t>
+              <a:t>10/7/2020</a:t>
             </a:fld>
             <a:endParaRPr lang="en-US" dirty="0"/>
           </a:p>
@@ -2882,7 +2883,7 @@
             <a:fld id="{09B482E8-6E0E-1B4F-B1FD-C69DB9E858D9}" type="datetimeFigureOut">
               <a:rPr lang="en-US" smtClean="0"/>
               <a:pPr/>
-              <a:t>9/23/2020</a:t>
+              <a:t>10/7/2020</a:t>
             </a:fld>
             <a:endParaRPr lang="en-US" dirty="0"/>
           </a:p>
@@ -3355,7 +3356,7 @@
           <p:cNvPr id="4" name="Title 1">
             <a:extLst>
               <a:ext uri="{FF2B5EF4-FFF2-40B4-BE49-F238E27FC236}">
-                <a16:creationId xmlns:a16="http://schemas.microsoft.com/office/drawing/2014/main" xmlns="" id="{854162F5-84C3-E248-B56A-B760B2963C40}"/>
+                <a16:creationId xmlns="" xmlns:a16="http://schemas.microsoft.com/office/drawing/2014/main" id="{854162F5-84C3-E248-B56A-B760B2963C40}"/>
               </a:ext>
             </a:extLst>
           </p:cNvPr>
@@ -3465,7 +3466,7 @@
           <p:cNvPr id="2" name="Title 1">
             <a:extLst>
               <a:ext uri="{FF2B5EF4-FFF2-40B4-BE49-F238E27FC236}">
-                <a16:creationId xmlns:a16="http://schemas.microsoft.com/office/drawing/2014/main" xmlns="" id="{73FD4F77-028A-7A47-BC41-2C419FC56E27}"/>
+                <a16:creationId xmlns="" xmlns:a16="http://schemas.microsoft.com/office/drawing/2014/main" id="{73FD4F77-028A-7A47-BC41-2C419FC56E27}"/>
               </a:ext>
             </a:extLst>
           </p:cNvPr>
@@ -3498,7 +3499,7 @@
           <p:cNvPr id="1026" name="Picture 2" descr="Git na prática — Parte 1 (Subindo projeto para o github).">
             <a:extLst>
               <a:ext uri="{FF2B5EF4-FFF2-40B4-BE49-F238E27FC236}">
-                <a16:creationId xmlns:a16="http://schemas.microsoft.com/office/drawing/2014/main" xmlns="" id="{C41C7762-29AF-DE4A-8B75-0AA40134A4CA}"/>
+                <a16:creationId xmlns="" xmlns:a16="http://schemas.microsoft.com/office/drawing/2014/main" id="{C41C7762-29AF-DE4A-8B75-0AA40134A4CA}"/>
               </a:ext>
             </a:extLst>
           </p:cNvPr>
@@ -3543,7 +3544,7 @@
     </p:spTree>
     <p:extLst>
       <p:ext uri="{BB962C8B-B14F-4D97-AF65-F5344CB8AC3E}">
-        <p14:creationId xmlns:p14="http://schemas.microsoft.com/office/powerpoint/2010/main" val="3162062899"/>
+        <p14:creationId xmlns:p14="http://schemas.microsoft.com/office/powerpoint/2010/main" val="2526184820"/>
       </p:ext>
     </p:extLst>
   </p:cSld>
@@ -3582,7 +3583,7 @@
           <p:cNvPr id="6" name="TextBox 5">
             <a:extLst>
               <a:ext uri="{FF2B5EF4-FFF2-40B4-BE49-F238E27FC236}">
-                <a16:creationId xmlns:a16="http://schemas.microsoft.com/office/drawing/2014/main" xmlns="" id="{D5751BA7-3065-D045-A3E0-72C84756D1B7}"/>
+                <a16:creationId xmlns="" xmlns:a16="http://schemas.microsoft.com/office/drawing/2014/main" id="{D5751BA7-3065-D045-A3E0-72C84756D1B7}"/>
               </a:ext>
             </a:extLst>
           </p:cNvPr>
@@ -3726,7 +3727,7 @@
           <p:cNvPr id="6" name="TextBox 5">
             <a:extLst>
               <a:ext uri="{FF2B5EF4-FFF2-40B4-BE49-F238E27FC236}">
-                <a16:creationId xmlns:a16="http://schemas.microsoft.com/office/drawing/2014/main" xmlns="" id="{D5751BA7-3065-D045-A3E0-72C84756D1B7}"/>
+                <a16:creationId xmlns="" xmlns:a16="http://schemas.microsoft.com/office/drawing/2014/main" id="{D5751BA7-3065-D045-A3E0-72C84756D1B7}"/>
               </a:ext>
             </a:extLst>
           </p:cNvPr>
@@ -3735,8 +3736,8 @@
         </p:nvSpPr>
         <p:spPr>
           <a:xfrm>
-            <a:off x="475989" y="1213682"/>
-            <a:ext cx="8192022" cy="4770537"/>
+            <a:off x="437882" y="1313804"/>
+            <a:ext cx="8401317" cy="458267"/>
           </a:xfrm>
           <a:prstGeom prst="rect">
             <a:avLst/>
@@ -3749,58 +3750,23 @@
           </a:bodyPr>
           <a:lstStyle/>
           <a:p>
-            <a:pPr marL="457200" indent="-457200" algn="just">
-              <a:buFont typeface="Arial" panose="020B0604020202020204" pitchFamily="34" charset="0"/>
-              <a:buChar char="•"/>
-            </a:pPr>
-            <a:endParaRPr lang="pt-BR" sz="3200" dirty="0" smtClean="0"/>
-          </a:p>
-          <a:p>
-            <a:pPr marL="457200" indent="-457200" algn="just">
-              <a:buFont typeface="Arial" panose="020B0604020202020204" pitchFamily="34" charset="0"/>
-              <a:buChar char="•"/>
-            </a:pPr>
-            <a:r>
-              <a:rPr lang="pt-BR" sz="3200" dirty="0" smtClean="0"/>
-              <a:t>Muito </a:t>
-            </a:r>
-            <a:r>
-              <a:rPr lang="pt-BR" sz="3200" dirty="0"/>
-              <a:t>raramente trabalhamos sozinhos.</a:t>
-            </a:r>
-          </a:p>
-          <a:p>
-            <a:pPr marL="457200" indent="-457200" algn="just">
-              <a:buFont typeface="Arial" panose="020B0604020202020204" pitchFamily="34" charset="0"/>
-              <a:buChar char="•"/>
-            </a:pPr>
-            <a:r>
-              <a:rPr lang="pt-BR" sz="3200" dirty="0"/>
-              <a:t>Construir um sistema em equipe é um grande desafio. </a:t>
-            </a:r>
-            <a:endParaRPr lang="pt-BR" sz="3200" dirty="0" smtClean="0"/>
-          </a:p>
-          <a:p>
-            <a:pPr marL="457200" indent="-457200" algn="just">
-              <a:buFont typeface="Arial" panose="020B0604020202020204" pitchFamily="34" charset="0"/>
-              <a:buChar char="•"/>
-            </a:pPr>
-            <a:r>
-              <a:rPr lang="pt-BR" sz="3200" dirty="0" smtClean="0"/>
-              <a:t>Nosso </a:t>
-            </a:r>
-            <a:r>
-              <a:rPr lang="pt-BR" sz="3200" dirty="0"/>
-              <a:t>código tem que se integrar de maneira transparente e sem emendas com o código de todos os outros membros da nossa equipe.</a:t>
-            </a:r>
-          </a:p>
-          <a:p>
             <a:pPr algn="just">
               <a:lnSpc>
-                <a:spcPct val="150000"/>
+                <a:spcPct val="200000"/>
               </a:lnSpc>
             </a:pPr>
-            <a:endParaRPr lang="x-none" sz="3200" dirty="0"/>
+            <a:r>
+              <a:rPr lang="pt-BR" sz="1400" dirty="0" smtClean="0"/>
+              <a:t>Paulo Fonseca (Professor)</a:t>
+            </a:r>
+            <a:r>
+              <a:rPr lang="pt-BR" sz="1400" dirty="0"/>
+              <a:t> </a:t>
+            </a:r>
+            <a:r>
+              <a:rPr lang="pt-BR" sz="1400" smtClean="0"/>
+              <a:t>– paulo.fonseca@uniron.edu.br</a:t>
+            </a:r>
           </a:p>
         </p:txBody>
       </p:sp>
@@ -3832,12 +3798,8 @@
               </a:lnSpc>
             </a:pPr>
             <a:r>
-              <a:rPr lang="x-none" sz="2800" b="1" dirty="0"/>
-              <a:t>TRABALHANDO EM </a:t>
-            </a:r>
-            <a:r>
-              <a:rPr lang="x-none" sz="2800" b="1" dirty="0" smtClean="0"/>
-              <a:t>EQUIPE</a:t>
+              <a:rPr lang="pt-BR" sz="2800" b="1" dirty="0" smtClean="0"/>
+              <a:t>integrantes do 4º. Período 2020.2</a:t>
             </a:r>
             <a:endParaRPr lang="x-none" sz="2800" b="1" dirty="0"/>
           </a:p>
@@ -3846,7 +3808,7 @@
     </p:spTree>
     <p:extLst>
       <p:ext uri="{BB962C8B-B14F-4D97-AF65-F5344CB8AC3E}">
-        <p14:creationId xmlns:p14="http://schemas.microsoft.com/office/powerpoint/2010/main" val="3481684597"/>
+        <p14:creationId xmlns:p14="http://schemas.microsoft.com/office/powerpoint/2010/main" val="3790230199"/>
       </p:ext>
     </p:extLst>
   </p:cSld>
@@ -3885,7 +3847,7 @@
           <p:cNvPr id="6" name="TextBox 5">
             <a:extLst>
               <a:ext uri="{FF2B5EF4-FFF2-40B4-BE49-F238E27FC236}">
-                <a16:creationId xmlns:a16="http://schemas.microsoft.com/office/drawing/2014/main" xmlns="" id="{D5751BA7-3065-D045-A3E0-72C84756D1B7}"/>
+                <a16:creationId xmlns="" xmlns:a16="http://schemas.microsoft.com/office/drawing/2014/main" id="{D5751BA7-3065-D045-A3E0-72C84756D1B7}"/>
               </a:ext>
             </a:extLst>
           </p:cNvPr>
@@ -3894,8 +3856,8 @@
         </p:nvSpPr>
         <p:spPr>
           <a:xfrm>
-            <a:off x="475989" y="840919"/>
-            <a:ext cx="8192022" cy="5262979"/>
+            <a:off x="475989" y="1213682"/>
+            <a:ext cx="8192022" cy="4770537"/>
           </a:xfrm>
           <a:prstGeom prst="rect">
             <a:avLst/>
@@ -3908,142 +3870,58 @@
           </a:bodyPr>
           <a:lstStyle/>
           <a:p>
-            <a:pPr marL="342900" indent="-342900" algn="just">
+            <a:pPr marL="457200" indent="-457200" algn="just">
+              <a:buFont typeface="Arial" panose="020B0604020202020204" pitchFamily="34" charset="0"/>
+              <a:buChar char="•"/>
+            </a:pPr>
+            <a:endParaRPr lang="pt-BR" sz="3200" dirty="0" smtClean="0"/>
+          </a:p>
+          <a:p>
+            <a:pPr marL="457200" indent="-457200" algn="just">
+              <a:buFont typeface="Arial" panose="020B0604020202020204" pitchFamily="34" charset="0"/>
+              <a:buChar char="•"/>
+            </a:pPr>
+            <a:r>
+              <a:rPr lang="pt-BR" sz="3200" dirty="0" smtClean="0"/>
+              <a:t>Muito </a:t>
+            </a:r>
+            <a:r>
+              <a:rPr lang="pt-BR" sz="3200" dirty="0"/>
+              <a:t>raramente trabalhamos sozinhos.</a:t>
+            </a:r>
+          </a:p>
+          <a:p>
+            <a:pPr marL="457200" indent="-457200" algn="just">
+              <a:buFont typeface="Arial" panose="020B0604020202020204" pitchFamily="34" charset="0"/>
+              <a:buChar char="•"/>
+            </a:pPr>
+            <a:r>
+              <a:rPr lang="pt-BR" sz="3200" dirty="0"/>
+              <a:t>Construir um sistema em equipe é um grande desafio. </a:t>
+            </a:r>
+            <a:endParaRPr lang="pt-BR" sz="3200" dirty="0" smtClean="0"/>
+          </a:p>
+          <a:p>
+            <a:pPr marL="457200" indent="-457200" algn="just">
+              <a:buFont typeface="Arial" panose="020B0604020202020204" pitchFamily="34" charset="0"/>
+              <a:buChar char="•"/>
+            </a:pPr>
+            <a:r>
+              <a:rPr lang="pt-BR" sz="3200" dirty="0" smtClean="0"/>
+              <a:t>Nosso </a:t>
+            </a:r>
+            <a:r>
+              <a:rPr lang="pt-BR" sz="3200" dirty="0"/>
+              <a:t>código tem que se integrar de maneira transparente e sem emendas com o código de todos os outros membros da nossa equipe.</a:t>
+            </a:r>
+          </a:p>
+          <a:p>
+            <a:pPr algn="just">
               <a:lnSpc>
                 <a:spcPct val="150000"/>
               </a:lnSpc>
-              <a:buFont typeface="Arial" panose="020B0604020202020204" pitchFamily="34" charset="0"/>
-              <a:buChar char="•"/>
             </a:pPr>
-            <a:r>
-              <a:rPr lang="x-none" sz="3200" dirty="0" smtClean="0"/>
-              <a:t>Ferramentas </a:t>
-            </a:r>
-            <a:r>
-              <a:rPr lang="x-none" sz="3200" dirty="0"/>
-              <a:t>que funcionam como máquinas do tempo e robôs de </a:t>
-            </a:r>
-            <a:r>
-              <a:rPr lang="x-none" sz="3200" dirty="0" smtClean="0"/>
-              <a:t>integração</a:t>
-            </a:r>
-            <a:r>
-              <a:rPr lang="pt-BR" sz="3200" dirty="0" smtClean="0"/>
-              <a:t> dos documentos</a:t>
-            </a:r>
-            <a:r>
-              <a:rPr lang="x-none" sz="3200" dirty="0" smtClean="0"/>
-              <a:t>;</a:t>
-            </a:r>
             <a:endParaRPr lang="x-none" sz="3200" dirty="0"/>
-          </a:p>
-          <a:p>
-            <a:pPr marL="342900" indent="-342900" algn="just">
-              <a:lnSpc>
-                <a:spcPct val="150000"/>
-              </a:lnSpc>
-              <a:buFont typeface="Arial" panose="020B0604020202020204" pitchFamily="34" charset="0"/>
-              <a:buChar char="•"/>
-            </a:pPr>
-            <a:r>
-              <a:rPr lang="x-none" sz="3200" dirty="0"/>
-              <a:t>Mostra todo o </a:t>
-            </a:r>
-            <a:r>
-              <a:rPr lang="x-none" sz="3200" dirty="0" smtClean="0"/>
-              <a:t>histórico</a:t>
-            </a:r>
-            <a:r>
-              <a:rPr lang="pt-BR" sz="3200" dirty="0" smtClean="0"/>
-              <a:t> do documento</a:t>
-            </a:r>
-            <a:r>
-              <a:rPr lang="x-none" sz="3200" dirty="0" smtClean="0"/>
-              <a:t>;</a:t>
-            </a:r>
-            <a:endParaRPr lang="x-none" sz="3200" dirty="0"/>
-          </a:p>
-          <a:p>
-            <a:pPr marL="342900" indent="-342900" algn="just">
-              <a:lnSpc>
-                <a:spcPct val="150000"/>
-              </a:lnSpc>
-              <a:buFont typeface="Arial" panose="020B0604020202020204" pitchFamily="34" charset="0"/>
-              <a:buChar char="•"/>
-            </a:pPr>
-            <a:r>
-              <a:rPr lang="x-none" sz="3200" dirty="0"/>
-              <a:t>Possui um </a:t>
-            </a:r>
-            <a:r>
-              <a:rPr lang="x-none" sz="3200" dirty="0" smtClean="0"/>
-              <a:t>repositório.</a:t>
-            </a:r>
-            <a:endParaRPr lang="pt-BR" sz="3200" dirty="0" smtClean="0"/>
-          </a:p>
-          <a:p>
-            <a:pPr marL="342900" indent="-342900" algn="just">
-              <a:lnSpc>
-                <a:spcPct val="150000"/>
-              </a:lnSpc>
-              <a:buFont typeface="Arial" panose="020B0604020202020204" pitchFamily="34" charset="0"/>
-              <a:buChar char="•"/>
-            </a:pPr>
-            <a:r>
-              <a:rPr lang="pt-BR" sz="3200" i="1" dirty="0" smtClean="0"/>
-              <a:t>CVS</a:t>
-            </a:r>
-            <a:r>
-              <a:rPr lang="pt-BR" sz="3200" i="1" dirty="0"/>
-              <a:t>, </a:t>
-            </a:r>
-            <a:r>
-              <a:rPr lang="pt-BR" sz="3200" i="1" dirty="0" err="1"/>
-              <a:t>ClearCase</a:t>
-            </a:r>
-            <a:r>
-              <a:rPr lang="pt-BR" sz="3200" i="1" dirty="0"/>
-              <a:t>, </a:t>
-            </a:r>
-            <a:r>
-              <a:rPr lang="pt-BR" sz="3200" i="1" dirty="0" err="1"/>
-              <a:t>Source-Safe</a:t>
-            </a:r>
-            <a:r>
-              <a:rPr lang="pt-BR" sz="3200" i="1" dirty="0"/>
-              <a:t> e SVN </a:t>
-            </a:r>
-            <a:endParaRPr lang="pt-BR" sz="3200" i="1" dirty="0" smtClean="0"/>
-          </a:p>
-          <a:p>
-            <a:pPr marL="342900" indent="-342900" algn="just">
-              <a:lnSpc>
-                <a:spcPct val="150000"/>
-              </a:lnSpc>
-              <a:buFont typeface="Arial" panose="020B0604020202020204" pitchFamily="34" charset="0"/>
-              <a:buChar char="•"/>
-            </a:pPr>
-            <a:r>
-              <a:rPr lang="pt-BR" sz="3200" b="1" dirty="0"/>
-              <a:t>Mercurial, </a:t>
-            </a:r>
-            <a:r>
-              <a:rPr lang="pt-BR" sz="3200" b="1" dirty="0" err="1"/>
-              <a:t>Bazaar</a:t>
-            </a:r>
-            <a:r>
-              <a:rPr lang="pt-BR" sz="3200" b="1" dirty="0"/>
-              <a:t> e, é claro, </a:t>
-            </a:r>
-            <a:r>
-              <a:rPr lang="pt-BR" sz="3200" b="1" dirty="0" err="1" smtClean="0"/>
-              <a:t>Git</a:t>
-            </a:r>
-            <a:r>
-              <a:rPr lang="pt-BR" sz="3200" b="1" dirty="0" smtClean="0"/>
-              <a:t>.</a:t>
-            </a:r>
-            <a:endParaRPr lang="x-none" sz="3200" b="1" dirty="0"/>
           </a:p>
         </p:txBody>
       </p:sp>
@@ -4076,11 +3954,11 @@
             </a:pPr>
             <a:r>
               <a:rPr lang="x-none" sz="2800" b="1" dirty="0"/>
-              <a:t>SISTEMAS DE CONTROLE DE </a:t>
+              <a:t>TRABALHANDO EM </a:t>
             </a:r>
             <a:r>
               <a:rPr lang="x-none" sz="2800" b="1" dirty="0" smtClean="0"/>
-              <a:t>VERSÃO</a:t>
+              <a:t>EQUIPE</a:t>
             </a:r>
             <a:endParaRPr lang="x-none" sz="2800" b="1" dirty="0"/>
           </a:p>
@@ -4089,7 +3967,7 @@
     </p:spTree>
     <p:extLst>
       <p:ext uri="{BB962C8B-B14F-4D97-AF65-F5344CB8AC3E}">
-        <p14:creationId xmlns:p14="http://schemas.microsoft.com/office/powerpoint/2010/main" val="136320135"/>
+        <p14:creationId xmlns:p14="http://schemas.microsoft.com/office/powerpoint/2010/main" val="3481684597"/>
       </p:ext>
     </p:extLst>
   </p:cSld>
@@ -4128,7 +4006,7 @@
           <p:cNvPr id="6" name="TextBox 5">
             <a:extLst>
               <a:ext uri="{FF2B5EF4-FFF2-40B4-BE49-F238E27FC236}">
-                <a16:creationId xmlns:a16="http://schemas.microsoft.com/office/drawing/2014/main" xmlns="" id="{D5751BA7-3065-D045-A3E0-72C84756D1B7}"/>
+                <a16:creationId xmlns="" xmlns:a16="http://schemas.microsoft.com/office/drawing/2014/main" id="{D5751BA7-3065-D045-A3E0-72C84756D1B7}"/>
               </a:ext>
             </a:extLst>
           </p:cNvPr>
@@ -4138,7 +4016,7 @@
         <p:spPr>
           <a:xfrm>
             <a:off x="475989" y="840919"/>
-            <a:ext cx="8192022" cy="4524315"/>
+            <a:ext cx="8192022" cy="5262979"/>
           </a:xfrm>
           <a:prstGeom prst="rect">
             <a:avLst/>
@@ -4150,14 +4028,6 @@
             <a:spAutoFit/>
           </a:bodyPr>
           <a:lstStyle/>
-          <a:p>
-            <a:pPr algn="just">
-              <a:lnSpc>
-                <a:spcPct val="150000"/>
-              </a:lnSpc>
-            </a:pPr>
-            <a:endParaRPr lang="x-none" sz="3200" dirty="0" smtClean="0"/>
-          </a:p>
           <a:p>
             <a:pPr marL="342900" indent="-342900" algn="just">
               <a:lnSpc>
@@ -4168,8 +4038,25 @@
             </a:pPr>
             <a:r>
               <a:rPr lang="x-none" sz="3200" dirty="0" smtClean="0"/>
-              <a:t>Criado em 2005 por Linus Torvalds, após se mostrar descontente com o BitKeeper, ferramenta utilizada anteriormente para versionamento do kernel Linux;</a:t>
-            </a:r>
+              <a:t>Ferramentas </a:t>
+            </a:r>
+            <a:r>
+              <a:rPr lang="x-none" sz="3200" dirty="0"/>
+              <a:t>que funcionam como máquinas do tempo e robôs de </a:t>
+            </a:r>
+            <a:r>
+              <a:rPr lang="x-none" sz="3200" dirty="0" smtClean="0"/>
+              <a:t>integração</a:t>
+            </a:r>
+            <a:r>
+              <a:rPr lang="pt-BR" sz="3200" dirty="0" smtClean="0"/>
+              <a:t> dos documentos</a:t>
+            </a:r>
+            <a:r>
+              <a:rPr lang="x-none" sz="3200" dirty="0" smtClean="0"/>
+              <a:t>;</a:t>
+            </a:r>
+            <a:endParaRPr lang="x-none" sz="3200" dirty="0"/>
           </a:p>
           <a:p>
             <a:pPr marL="342900" indent="-342900" algn="just">
@@ -4180,19 +4067,110 @@
               <a:buChar char="•"/>
             </a:pPr>
             <a:r>
+              <a:rPr lang="x-none" sz="3200" dirty="0"/>
+              <a:t>Mostra todo o </a:t>
+            </a:r>
+            <a:r>
               <a:rPr lang="x-none" sz="3200" dirty="0" smtClean="0"/>
-              <a:t>Utilizado </a:t>
-            </a:r>
+              <a:t>histórico</a:t>
+            </a:r>
+            <a:r>
+              <a:rPr lang="pt-BR" sz="3200" dirty="0" smtClean="0"/>
+              <a:t> do documento</a:t>
+            </a:r>
+            <a:r>
+              <a:rPr lang="x-none" sz="3200" dirty="0" smtClean="0"/>
+              <a:t>;</a:t>
+            </a:r>
+            <a:endParaRPr lang="x-none" sz="3200" dirty="0"/>
+          </a:p>
+          <a:p>
+            <a:pPr marL="342900" indent="-342900" algn="just">
+              <a:lnSpc>
+                <a:spcPct val="150000"/>
+              </a:lnSpc>
+              <a:buFont typeface="Arial" panose="020B0604020202020204" pitchFamily="34" charset="0"/>
+              <a:buChar char="•"/>
+            </a:pPr>
             <a:r>
               <a:rPr lang="x-none" sz="3200" dirty="0"/>
-              <a:t>amplamente em todo o mundo.</a:t>
-            </a:r>
-          </a:p>
-        </p:txBody>
-      </p:sp>
-      <p:sp>
-        <p:nvSpPr>
-          <p:cNvPr id="4" name="Título 1"/>
+              <a:t>Possui um </a:t>
+            </a:r>
+            <a:r>
+              <a:rPr lang="x-none" sz="3200" dirty="0" smtClean="0"/>
+              <a:t>repositório.</a:t>
+            </a:r>
+            <a:endParaRPr lang="pt-BR" sz="3200" dirty="0" smtClean="0"/>
+          </a:p>
+          <a:p>
+            <a:pPr marL="342900" indent="-342900" algn="just">
+              <a:lnSpc>
+                <a:spcPct val="150000"/>
+              </a:lnSpc>
+              <a:buFont typeface="Arial" panose="020B0604020202020204" pitchFamily="34" charset="0"/>
+              <a:buChar char="•"/>
+            </a:pPr>
+            <a:r>
+              <a:rPr lang="pt-BR" sz="3200" i="1" dirty="0" smtClean="0"/>
+              <a:t>CVS</a:t>
+            </a:r>
+            <a:r>
+              <a:rPr lang="pt-BR" sz="3200" i="1" dirty="0"/>
+              <a:t>, </a:t>
+            </a:r>
+            <a:r>
+              <a:rPr lang="pt-BR" sz="3200" i="1" dirty="0" err="1"/>
+              <a:t>ClearCase</a:t>
+            </a:r>
+            <a:r>
+              <a:rPr lang="pt-BR" sz="3200" i="1" dirty="0"/>
+              <a:t>, </a:t>
+            </a:r>
+            <a:r>
+              <a:rPr lang="pt-BR" sz="3200" i="1" dirty="0" err="1"/>
+              <a:t>Source-Safe</a:t>
+            </a:r>
+            <a:r>
+              <a:rPr lang="pt-BR" sz="3200" i="1" dirty="0"/>
+              <a:t> e SVN </a:t>
+            </a:r>
+            <a:endParaRPr lang="pt-BR" sz="3200" i="1" dirty="0" smtClean="0"/>
+          </a:p>
+          <a:p>
+            <a:pPr marL="342900" indent="-342900" algn="just">
+              <a:lnSpc>
+                <a:spcPct val="150000"/>
+              </a:lnSpc>
+              <a:buFont typeface="Arial" panose="020B0604020202020204" pitchFamily="34" charset="0"/>
+              <a:buChar char="•"/>
+            </a:pPr>
+            <a:r>
+              <a:rPr lang="pt-BR" sz="3200" b="1" dirty="0"/>
+              <a:t>Mercurial, </a:t>
+            </a:r>
+            <a:r>
+              <a:rPr lang="pt-BR" sz="3200" b="1" dirty="0" err="1"/>
+              <a:t>Bazaar</a:t>
+            </a:r>
+            <a:r>
+              <a:rPr lang="pt-BR" sz="3200" b="1" dirty="0"/>
+              <a:t> e, é claro, </a:t>
+            </a:r>
+            <a:r>
+              <a:rPr lang="pt-BR" sz="3200" b="1" dirty="0" err="1" smtClean="0"/>
+              <a:t>Git</a:t>
+            </a:r>
+            <a:r>
+              <a:rPr lang="pt-BR" sz="3200" b="1" dirty="0" smtClean="0"/>
+              <a:t>.</a:t>
+            </a:r>
+            <a:endParaRPr lang="x-none" sz="3200" b="1" dirty="0"/>
+          </a:p>
+        </p:txBody>
+      </p:sp>
+      <p:sp>
+        <p:nvSpPr>
+          <p:cNvPr id="3" name="Título 1"/>
           <p:cNvSpPr>
             <a:spLocks noGrp="1"/>
           </p:cNvSpPr>
@@ -4218,8 +4196,12 @@
               </a:lnSpc>
             </a:pPr>
             <a:r>
+              <a:rPr lang="x-none" sz="2800" b="1" dirty="0"/>
+              <a:t>SISTEMAS DE CONTROLE DE </a:t>
+            </a:r>
+            <a:r>
               <a:rPr lang="x-none" sz="2800" b="1" dirty="0" smtClean="0"/>
-              <a:t>GIT</a:t>
+              <a:t>VERSÃO</a:t>
             </a:r>
             <a:endParaRPr lang="x-none" sz="2800" b="1" dirty="0"/>
           </a:p>
@@ -4228,7 +4210,7 @@
     </p:spTree>
     <p:extLst>
       <p:ext uri="{BB962C8B-B14F-4D97-AF65-F5344CB8AC3E}">
-        <p14:creationId xmlns:p14="http://schemas.microsoft.com/office/powerpoint/2010/main" val="1502040706"/>
+        <p14:creationId xmlns:p14="http://schemas.microsoft.com/office/powerpoint/2010/main" val="136320135"/>
       </p:ext>
     </p:extLst>
   </p:cSld>
@@ -4267,7 +4249,7 @@
           <p:cNvPr id="6" name="TextBox 5">
             <a:extLst>
               <a:ext uri="{FF2B5EF4-FFF2-40B4-BE49-F238E27FC236}">
-                <a16:creationId xmlns:a16="http://schemas.microsoft.com/office/drawing/2014/main" xmlns="" id="{D5751BA7-3065-D045-A3E0-72C84756D1B7}"/>
+                <a16:creationId xmlns="" xmlns:a16="http://schemas.microsoft.com/office/drawing/2014/main" id="{D5751BA7-3065-D045-A3E0-72C84756D1B7}"/>
               </a:ext>
             </a:extLst>
           </p:cNvPr>
@@ -4276,8 +4258,8 @@
         </p:nvSpPr>
         <p:spPr>
           <a:xfrm>
-            <a:off x="475988" y="840919"/>
-            <a:ext cx="8577859" cy="4524315"/>
+            <a:off x="475989" y="840919"/>
+            <a:ext cx="8192022" cy="4524315"/>
           </a:xfrm>
           <a:prstGeom prst="rect">
             <a:avLst/>
@@ -4295,7 +4277,7 @@
                 <a:spcPct val="150000"/>
               </a:lnSpc>
             </a:pPr>
-            <a:endParaRPr lang="x-none" sz="3200" b="1" dirty="0"/>
+            <a:endParaRPr lang="x-none" sz="3200" dirty="0" smtClean="0"/>
           </a:p>
           <a:p>
             <a:pPr marL="342900" indent="-342900" algn="just">
@@ -4307,11 +4289,7 @@
             </a:pPr>
             <a:r>
               <a:rPr lang="x-none" sz="3200" dirty="0" smtClean="0"/>
-              <a:t>Aplicação </a:t>
-            </a:r>
-            <a:r>
-              <a:rPr lang="x-none" sz="3200" dirty="0"/>
-              <a:t>Web criada em 2008 que permite a hospedagem de repositórios Git;</a:t>
+              <a:t>Criado em 2005 por Linus Torvalds, após se mostrar descontente com o BitKeeper, ferramenta utilizada anteriormente para versionamento do kernel Linux;</a:t>
             </a:r>
           </a:p>
           <a:p>
@@ -4323,28 +4301,19 @@
               <a:buChar char="•"/>
             </a:pPr>
             <a:r>
+              <a:rPr lang="x-none" sz="3200" dirty="0" smtClean="0"/>
+              <a:t>Utilizado </a:t>
+            </a:r>
+            <a:r>
               <a:rPr lang="x-none" sz="3200" dirty="0"/>
-              <a:t>Atua também como uma rede social;</a:t>
-            </a:r>
-          </a:p>
-          <a:p>
-            <a:pPr marL="342900" indent="-342900" algn="just">
-              <a:lnSpc>
-                <a:spcPct val="150000"/>
-              </a:lnSpc>
-              <a:buFont typeface="Arial" panose="020B0604020202020204" pitchFamily="34" charset="0"/>
-              <a:buChar char="•"/>
-            </a:pPr>
-            <a:r>
-              <a:rPr lang="x-none" sz="3200" dirty="0"/>
-              <a:t>Possui atualmente uma grande parte de projetos de códigos abertos.</a:t>
-            </a:r>
-          </a:p>
-        </p:txBody>
-      </p:sp>
-      <p:sp>
-        <p:nvSpPr>
-          <p:cNvPr id="3" name="Título 1"/>
+              <a:t>amplamente em todo o mundo.</a:t>
+            </a:r>
+          </a:p>
+        </p:txBody>
+      </p:sp>
+      <p:sp>
+        <p:nvSpPr>
+          <p:cNvPr id="4" name="Título 1"/>
           <p:cNvSpPr>
             <a:spLocks noGrp="1"/>
           </p:cNvSpPr>
@@ -4370,24 +4339,17 @@
               </a:lnSpc>
             </a:pPr>
             <a:r>
-              <a:rPr lang="x-none" sz="2800" b="1" dirty="0"/>
-              <a:t>HOSPEDANDO </a:t>
-            </a:r>
-            <a:r>
               <a:rPr lang="x-none" sz="2800" b="1" dirty="0" smtClean="0"/>
-              <a:t>NO </a:t>
-            </a:r>
-            <a:r>
-              <a:rPr lang="x-none" sz="2800" b="1" dirty="0"/>
-              <a:t>GITHUB</a:t>
-            </a:r>
+              <a:t>GIT</a:t>
+            </a:r>
+            <a:endParaRPr lang="x-none" sz="2800" b="1" dirty="0"/>
           </a:p>
         </p:txBody>
       </p:sp>
     </p:spTree>
     <p:extLst>
       <p:ext uri="{BB962C8B-B14F-4D97-AF65-F5344CB8AC3E}">
-        <p14:creationId xmlns:p14="http://schemas.microsoft.com/office/powerpoint/2010/main" val="1132454803"/>
+        <p14:creationId xmlns:p14="http://schemas.microsoft.com/office/powerpoint/2010/main" val="1502040706"/>
       </p:ext>
     </p:extLst>
   </p:cSld>
@@ -4426,7 +4388,166 @@
           <p:cNvPr id="6" name="TextBox 5">
             <a:extLst>
               <a:ext uri="{FF2B5EF4-FFF2-40B4-BE49-F238E27FC236}">
-                <a16:creationId xmlns:a16="http://schemas.microsoft.com/office/drawing/2014/main" xmlns="" id="{D5751BA7-3065-D045-A3E0-72C84756D1B7}"/>
+                <a16:creationId xmlns="" xmlns:a16="http://schemas.microsoft.com/office/drawing/2014/main" id="{D5751BA7-3065-D045-A3E0-72C84756D1B7}"/>
+              </a:ext>
+            </a:extLst>
+          </p:cNvPr>
+          <p:cNvSpPr txBox="1"/>
+          <p:nvPr/>
+        </p:nvSpPr>
+        <p:spPr>
+          <a:xfrm>
+            <a:off x="475988" y="840919"/>
+            <a:ext cx="8577859" cy="4524315"/>
+          </a:xfrm>
+          <a:prstGeom prst="rect">
+            <a:avLst/>
+          </a:prstGeom>
+          <a:noFill/>
+        </p:spPr>
+        <p:txBody>
+          <a:bodyPr wrap="square" rtlCol="0">
+            <a:spAutoFit/>
+          </a:bodyPr>
+          <a:lstStyle/>
+          <a:p>
+            <a:pPr algn="just">
+              <a:lnSpc>
+                <a:spcPct val="150000"/>
+              </a:lnSpc>
+            </a:pPr>
+            <a:endParaRPr lang="x-none" sz="3200" b="1" dirty="0"/>
+          </a:p>
+          <a:p>
+            <a:pPr marL="342900" indent="-342900" algn="just">
+              <a:lnSpc>
+                <a:spcPct val="150000"/>
+              </a:lnSpc>
+              <a:buFont typeface="Arial" panose="020B0604020202020204" pitchFamily="34" charset="0"/>
+              <a:buChar char="•"/>
+            </a:pPr>
+            <a:r>
+              <a:rPr lang="x-none" sz="3200" dirty="0" smtClean="0"/>
+              <a:t>Aplicação </a:t>
+            </a:r>
+            <a:r>
+              <a:rPr lang="x-none" sz="3200" dirty="0"/>
+              <a:t>Web criada em 2008 que permite a hospedagem de repositórios Git;</a:t>
+            </a:r>
+          </a:p>
+          <a:p>
+            <a:pPr marL="342900" indent="-342900" algn="just">
+              <a:lnSpc>
+                <a:spcPct val="150000"/>
+              </a:lnSpc>
+              <a:buFont typeface="Arial" panose="020B0604020202020204" pitchFamily="34" charset="0"/>
+              <a:buChar char="•"/>
+            </a:pPr>
+            <a:r>
+              <a:rPr lang="x-none" sz="3200" dirty="0"/>
+              <a:t>Atua também como uma rede social;</a:t>
+            </a:r>
+          </a:p>
+          <a:p>
+            <a:pPr marL="342900" indent="-342900" algn="just">
+              <a:lnSpc>
+                <a:spcPct val="150000"/>
+              </a:lnSpc>
+              <a:buFont typeface="Arial" panose="020B0604020202020204" pitchFamily="34" charset="0"/>
+              <a:buChar char="•"/>
+            </a:pPr>
+            <a:r>
+              <a:rPr lang="x-none" sz="3200" dirty="0"/>
+              <a:t>Possui atualmente uma grande parte de projetos de códigos abertos.</a:t>
+            </a:r>
+          </a:p>
+        </p:txBody>
+      </p:sp>
+      <p:sp>
+        <p:nvSpPr>
+          <p:cNvPr id="3" name="Título 1"/>
+          <p:cNvSpPr>
+            <a:spLocks noGrp="1"/>
+          </p:cNvSpPr>
+          <p:nvPr>
+            <p:ph type="title"/>
+          </p:nvPr>
+        </p:nvSpPr>
+        <p:spPr>
+          <a:xfrm>
+            <a:off x="437883" y="11655"/>
+            <a:ext cx="8203842" cy="902745"/>
+          </a:xfrm>
+        </p:spPr>
+        <p:txBody>
+          <a:bodyPr>
+            <a:normAutofit fontScale="90000"/>
+          </a:bodyPr>
+          <a:lstStyle/>
+          <a:p>
+            <a:pPr>
+              <a:lnSpc>
+                <a:spcPct val="200000"/>
+              </a:lnSpc>
+            </a:pPr>
+            <a:r>
+              <a:rPr lang="x-none" sz="2800" b="1" dirty="0"/>
+              <a:t>HOSPEDANDO </a:t>
+            </a:r>
+            <a:r>
+              <a:rPr lang="x-none" sz="2800" b="1" dirty="0" smtClean="0"/>
+              <a:t>NO </a:t>
+            </a:r>
+            <a:r>
+              <a:rPr lang="x-none" sz="2800" b="1" dirty="0"/>
+              <a:t>GITHUB</a:t>
+            </a:r>
+          </a:p>
+        </p:txBody>
+      </p:sp>
+    </p:spTree>
+    <p:extLst>
+      <p:ext uri="{BB962C8B-B14F-4D97-AF65-F5344CB8AC3E}">
+        <p14:creationId xmlns:p14="http://schemas.microsoft.com/office/powerpoint/2010/main" val="1132454803"/>
+      </p:ext>
+    </p:extLst>
+  </p:cSld>
+  <p:clrMapOvr>
+    <a:masterClrMapping/>
+  </p:clrMapOvr>
+  <p:timing>
+    <p:tnLst>
+      <p:par>
+        <p:cTn id="1" dur="indefinite" restart="never" nodeType="tmRoot"/>
+      </p:par>
+    </p:tnLst>
+  </p:timing>
+</p:sld>
+</file>
+
+<file path=ppt/slides/slide9.xml><?xml version="1.0" encoding="utf-8"?>
+<p:sld xmlns:a="http://schemas.openxmlformats.org/drawingml/2006/main" xmlns:r="http://schemas.openxmlformats.org/officeDocument/2006/relationships" xmlns:p="http://schemas.openxmlformats.org/presentationml/2006/main">
+  <p:cSld>
+    <p:spTree>
+      <p:nvGrpSpPr>
+        <p:cNvPr id="1" name=""/>
+        <p:cNvGrpSpPr/>
+        <p:nvPr/>
+      </p:nvGrpSpPr>
+      <p:grpSpPr>
+        <a:xfrm>
+          <a:off x="0" y="0"/>
+          <a:ext cx="0" cy="0"/>
+          <a:chOff x="0" y="0"/>
+          <a:chExt cx="0" cy="0"/>
+        </a:xfrm>
+      </p:grpSpPr>
+      <p:sp>
+        <p:nvSpPr>
+          <p:cNvPr id="6" name="TextBox 5">
+            <a:extLst>
+              <a:ext uri="{FF2B5EF4-FFF2-40B4-BE49-F238E27FC236}">
+                <a16:creationId xmlns="" xmlns:a16="http://schemas.microsoft.com/office/drawing/2014/main" id="{D5751BA7-3065-D045-A3E0-72C84756D1B7}"/>
               </a:ext>
             </a:extLst>
           </p:cNvPr>

</xml_diff>

<commit_message>
acrescentando meu nome e email
isso foi um exerício no qual o intuito era alterar um arquivo usando versionamento do git. agora introduzi meu nome e email.
</commit_message>
<xml_diff>
--- a/Controlando versões com Git e Github - Capítulo I.pptx
+++ b/Controlando versões com Git e Github - Capítulo I.pptx
@@ -5,15 +5,16 @@
     <p:sldMasterId id="2147483733" r:id="rId1"/>
   </p:sldMasterIdLst>
   <p:sldIdLst>
-    <p:sldId id="256" r:id="rId2"/>
-    <p:sldId id="264" r:id="rId3"/>
-    <p:sldId id="257" r:id="rId4"/>
-    <p:sldId id="265" r:id="rId5"/>
-    <p:sldId id="258" r:id="rId6"/>
-    <p:sldId id="259" r:id="rId7"/>
-    <p:sldId id="260" r:id="rId8"/>
-    <p:sldId id="261" r:id="rId9"/>
-    <p:sldId id="263" r:id="rId10"/>
+    <p:sldId id="266" r:id="rId2"/>
+    <p:sldId id="256" r:id="rId3"/>
+    <p:sldId id="264" r:id="rId4"/>
+    <p:sldId id="257" r:id="rId5"/>
+    <p:sldId id="265" r:id="rId6"/>
+    <p:sldId id="258" r:id="rId7"/>
+    <p:sldId id="259" r:id="rId8"/>
+    <p:sldId id="260" r:id="rId9"/>
+    <p:sldId id="261" r:id="rId10"/>
+    <p:sldId id="263" r:id="rId11"/>
   </p:sldIdLst>
   <p:sldSz cx="9144000" cy="6858000" type="screen4x3"/>
   <p:notesSz cx="6858000" cy="9144000"/>
@@ -284,7 +285,7 @@
             <a:fld id="{08B9EBBA-996F-894A-B54A-D6246ED52CEA}" type="datetimeFigureOut">
               <a:rPr lang="en-US" smtClean="0"/>
               <a:pPr/>
-              <a:t>10/7/2020</a:t>
+              <a:t>10/10/2020</a:t>
             </a:fld>
             <a:endParaRPr lang="en-US" dirty="0"/>
           </a:p>
@@ -456,7 +457,7 @@
             <a:fld id="{C6C52C72-DE31-F449-A4ED-4C594FD91407}" type="datetimeFigureOut">
               <a:rPr lang="en-US" smtClean="0"/>
               <a:pPr/>
-              <a:t>10/7/2020</a:t>
+              <a:t>10/10/2020</a:t>
             </a:fld>
             <a:endParaRPr lang="en-US" dirty="0"/>
           </a:p>
@@ -638,7 +639,7 @@
             <a:fld id="{ED62726E-379B-B349-9EED-81ED093FA806}" type="datetimeFigureOut">
               <a:rPr lang="en-US" smtClean="0"/>
               <a:pPr/>
-              <a:t>10/7/2020</a:t>
+              <a:t>10/10/2020</a:t>
             </a:fld>
             <a:endParaRPr lang="en-US" dirty="0"/>
           </a:p>
@@ -810,7 +811,7 @@
             <a:fld id="{9B3A1323-8D79-1946-B0D7-40001CF92E9D}" type="datetimeFigureOut">
               <a:rPr lang="en-US" smtClean="0"/>
               <a:pPr/>
-              <a:t>10/7/2020</a:t>
+              <a:t>10/10/2020</a:t>
             </a:fld>
             <a:endParaRPr lang="en-US" dirty="0"/>
           </a:p>
@@ -1080,7 +1081,7 @@
             <a:fld id="{8DFA1846-DA80-1C48-A609-854EA85C59AD}" type="datetimeFigureOut">
               <a:rPr lang="en-US" smtClean="0"/>
               <a:pPr/>
-              <a:t>10/7/2020</a:t>
+              <a:t>10/10/2020</a:t>
             </a:fld>
             <a:endParaRPr lang="en-US" dirty="0"/>
           </a:p>
@@ -1314,7 +1315,7 @@
             <a:fld id="{57302355-E14B-8545-A8F8-0FE83CC9D524}" type="datetimeFigureOut">
               <a:rPr lang="en-US" smtClean="0"/>
               <a:pPr/>
-              <a:t>10/7/2020</a:t>
+              <a:t>10/10/2020</a:t>
             </a:fld>
             <a:endParaRPr lang="en-US" dirty="0"/>
           </a:p>
@@ -1675,7 +1676,7 @@
             <a:fld id="{09B482E8-6E0E-1B4F-B1FD-C69DB9E858D9}" type="datetimeFigureOut">
               <a:rPr lang="en-US" smtClean="0"/>
               <a:pPr/>
-              <a:t>10/7/2020</a:t>
+              <a:t>10/10/2020</a:t>
             </a:fld>
             <a:endParaRPr lang="en-US" dirty="0"/>
           </a:p>
@@ -1819,7 +1820,7 @@
             <a:fld id="{F13A34C8-038E-2045-AF43-DF7DBB8E0E9E}" type="datetimeFigureOut">
               <a:rPr lang="en-US" smtClean="0"/>
               <a:pPr/>
-              <a:t>10/7/2020</a:t>
+              <a:t>10/10/2020</a:t>
             </a:fld>
             <a:endParaRPr lang="en-US" dirty="0"/>
           </a:p>
@@ -1916,7 +1917,7 @@
             <a:fld id="{8818C68F-D26B-8F47-958C-23B49CF8A634}" type="datetimeFigureOut">
               <a:rPr lang="en-US" smtClean="0"/>
               <a:pPr/>
-              <a:t>10/7/2020</a:t>
+              <a:t>10/10/2020</a:t>
             </a:fld>
             <a:endParaRPr lang="en-US" dirty="0"/>
           </a:p>
@@ -2275,7 +2276,7 @@
             <a:fld id="{D0DF5E60-9974-AC48-9591-99C2BB44B7CF}" type="datetimeFigureOut">
               <a:rPr lang="en-US" smtClean="0"/>
               <a:pPr/>
-              <a:t>10/7/2020</a:t>
+              <a:t>10/10/2020</a:t>
             </a:fld>
             <a:endParaRPr lang="en-US" dirty="0"/>
           </a:p>
@@ -2636,7 +2637,7 @@
             <a:fld id="{09B482E8-6E0E-1B4F-B1FD-C69DB9E858D9}" type="datetimeFigureOut">
               <a:rPr lang="en-US" smtClean="0"/>
               <a:pPr/>
-              <a:t>10/7/2020</a:t>
+              <a:t>10/10/2020</a:t>
             </a:fld>
             <a:endParaRPr lang="en-US" dirty="0"/>
           </a:p>
@@ -2883,7 +2884,7 @@
             <a:fld id="{09B482E8-6E0E-1B4F-B1FD-C69DB9E858D9}" type="datetimeFigureOut">
               <a:rPr lang="en-US" smtClean="0"/>
               <a:pPr/>
-              <a:t>10/7/2020</a:t>
+              <a:t>10/10/2020</a:t>
             </a:fld>
             <a:endParaRPr lang="en-US" dirty="0"/>
           </a:p>
@@ -3321,6 +3322,264 @@
 </file>
 
 <file path=ppt/slides/slide1.xml><?xml version="1.0" encoding="utf-8"?>
+<p:sld xmlns:a="http://schemas.openxmlformats.org/drawingml/2006/main" xmlns:r="http://schemas.openxmlformats.org/officeDocument/2006/relationships" xmlns:p="http://schemas.openxmlformats.org/presentationml/2006/main">
+  <p:cSld>
+    <p:spTree>
+      <p:nvGrpSpPr>
+        <p:cNvPr id="1" name=""/>
+        <p:cNvGrpSpPr/>
+        <p:nvPr/>
+      </p:nvGrpSpPr>
+      <p:grpSpPr>
+        <a:xfrm>
+          <a:off x="0" y="0"/>
+          <a:ext cx="0" cy="0"/>
+          <a:chOff x="0" y="0"/>
+          <a:chExt cx="0" cy="0"/>
+        </a:xfrm>
+      </p:grpSpPr>
+      <p:sp>
+        <p:nvSpPr>
+          <p:cNvPr id="2" name="Título 1">
+            <a:extLst>
+              <a:ext uri="{FF2B5EF4-FFF2-40B4-BE49-F238E27FC236}">
+                <a16:creationId xmlns:a16="http://schemas.microsoft.com/office/drawing/2014/main" id="{E2AED92C-68A4-44C0-9741-B66CE0D03E9E}"/>
+              </a:ext>
+            </a:extLst>
+          </p:cNvPr>
+          <p:cNvSpPr>
+            <a:spLocks noGrp="1"/>
+          </p:cNvSpPr>
+          <p:nvPr>
+            <p:ph type="title"/>
+          </p:nvPr>
+        </p:nvSpPr>
+        <p:spPr/>
+        <p:txBody>
+          <a:bodyPr/>
+          <a:lstStyle/>
+          <a:p>
+            <a:r>
+              <a:rPr lang="pt-BR" dirty="0"/>
+              <a:t>Nome e </a:t>
+            </a:r>
+            <a:r>
+              <a:rPr lang="pt-BR" dirty="0" err="1"/>
+              <a:t>email</a:t>
+            </a:r>
+            <a:endParaRPr lang="pt-BR" dirty="0"/>
+          </a:p>
+        </p:txBody>
+      </p:sp>
+      <p:sp>
+        <p:nvSpPr>
+          <p:cNvPr id="3" name="Espaço Reservado para Conteúdo 2">
+            <a:extLst>
+              <a:ext uri="{FF2B5EF4-FFF2-40B4-BE49-F238E27FC236}">
+                <a16:creationId xmlns:a16="http://schemas.microsoft.com/office/drawing/2014/main" id="{3ECF6D10-121E-4096-8B6B-76216617403F}"/>
+              </a:ext>
+            </a:extLst>
+          </p:cNvPr>
+          <p:cNvSpPr>
+            <a:spLocks noGrp="1"/>
+          </p:cNvSpPr>
+          <p:nvPr>
+            <p:ph idx="1"/>
+          </p:nvPr>
+        </p:nvSpPr>
+        <p:spPr/>
+        <p:txBody>
+          <a:bodyPr/>
+          <a:lstStyle/>
+          <a:p>
+            <a:r>
+              <a:rPr lang="pt-BR" dirty="0"/>
+              <a:t>Marcos José dos Santos</a:t>
+            </a:r>
+          </a:p>
+          <a:p>
+            <a:r>
+              <a:rPr lang="pt-BR">
+                <a:solidFill>
+                  <a:srgbClr val="3C4043"/>
+                </a:solidFill>
+                <a:effectLst/>
+              </a:rPr>
+              <a:t>marcosjsantos48</a:t>
+            </a:r>
+            <a:r>
+              <a:rPr lang="pt-BR" dirty="0">
+                <a:solidFill>
+                  <a:srgbClr val="3C4043"/>
+                </a:solidFill>
+                <a:effectLst/>
+              </a:rPr>
+              <a:t>@gmail.com</a:t>
+            </a:r>
+            <a:endParaRPr lang="pt-BR" dirty="0"/>
+          </a:p>
+          <a:p>
+            <a:endParaRPr lang="pt-BR" dirty="0"/>
+          </a:p>
+        </p:txBody>
+      </p:sp>
+    </p:spTree>
+    <p:extLst>
+      <p:ext uri="{BB962C8B-B14F-4D97-AF65-F5344CB8AC3E}">
+        <p14:creationId xmlns:p14="http://schemas.microsoft.com/office/powerpoint/2010/main" val="4038335251"/>
+      </p:ext>
+    </p:extLst>
+  </p:cSld>
+  <p:clrMapOvr>
+    <a:masterClrMapping/>
+  </p:clrMapOvr>
+</p:sld>
+</file>
+
+<file path=ppt/slides/slide10.xml><?xml version="1.0" encoding="utf-8"?>
+<p:sld xmlns:a="http://schemas.openxmlformats.org/drawingml/2006/main" xmlns:r="http://schemas.openxmlformats.org/officeDocument/2006/relationships" xmlns:p="http://schemas.openxmlformats.org/presentationml/2006/main">
+  <p:cSld>
+    <p:spTree>
+      <p:nvGrpSpPr>
+        <p:cNvPr id="1" name=""/>
+        <p:cNvGrpSpPr/>
+        <p:nvPr/>
+      </p:nvGrpSpPr>
+      <p:grpSpPr>
+        <a:xfrm>
+          <a:off x="0" y="0"/>
+          <a:ext cx="0" cy="0"/>
+          <a:chOff x="0" y="0"/>
+          <a:chExt cx="0" cy="0"/>
+        </a:xfrm>
+      </p:grpSpPr>
+      <p:sp>
+        <p:nvSpPr>
+          <p:cNvPr id="6" name="TextBox 5">
+            <a:extLst>
+              <a:ext uri="{FF2B5EF4-FFF2-40B4-BE49-F238E27FC236}">
+                <a16:creationId xmlns:a16="http://schemas.microsoft.com/office/drawing/2014/main" id="{D5751BA7-3065-D045-A3E0-72C84756D1B7}"/>
+              </a:ext>
+            </a:extLst>
+          </p:cNvPr>
+          <p:cNvSpPr txBox="1"/>
+          <p:nvPr/>
+        </p:nvSpPr>
+        <p:spPr>
+          <a:xfrm>
+            <a:off x="475988" y="840919"/>
+            <a:ext cx="8577859" cy="4770537"/>
+          </a:xfrm>
+          <a:prstGeom prst="rect">
+            <a:avLst/>
+          </a:prstGeom>
+          <a:noFill/>
+        </p:spPr>
+        <p:txBody>
+          <a:bodyPr wrap="square" rtlCol="0">
+            <a:spAutoFit/>
+          </a:bodyPr>
+          <a:lstStyle/>
+          <a:p>
+            <a:pPr algn="just">
+              <a:lnSpc>
+                <a:spcPct val="150000"/>
+              </a:lnSpc>
+            </a:pPr>
+            <a:endParaRPr lang="x-none" sz="3200" b="1" dirty="0"/>
+          </a:p>
+          <a:p>
+            <a:pPr marL="457200" indent="-457200">
+              <a:buFont typeface="Arial" panose="020B0604020202020204" pitchFamily="34" charset="0"/>
+              <a:buChar char="•"/>
+            </a:pPr>
+            <a:r>
+              <a:rPr lang="pt-BR" sz="3200" dirty="0"/>
+              <a:t>Atualmente, conhecer bem como utilizar o </a:t>
+            </a:r>
+            <a:r>
+              <a:rPr lang="pt-BR" sz="3200" dirty="0" err="1"/>
+              <a:t>Git</a:t>
+            </a:r>
+            <a:r>
+              <a:rPr lang="pt-BR" sz="3200" dirty="0"/>
+              <a:t> é uma habilidade importante para uma carreira bem-sucedida no desenvolvimento de </a:t>
+            </a:r>
+            <a:r>
+              <a:rPr lang="pt-BR" sz="3200"/>
+              <a:t>software.</a:t>
+            </a:r>
+          </a:p>
+          <a:p>
+            <a:pPr marL="457200" indent="-457200">
+              <a:buFont typeface="Arial" panose="020B0604020202020204" pitchFamily="34" charset="0"/>
+              <a:buChar char="•"/>
+            </a:pPr>
+            <a:endParaRPr lang="pt-BR" sz="3200" dirty="0"/>
+          </a:p>
+          <a:p>
+            <a:pPr marL="457200" indent="-457200" algn="just">
+              <a:buFont typeface="Arial" panose="020B0604020202020204" pitchFamily="34" charset="0"/>
+              <a:buChar char="•"/>
+            </a:pPr>
+            <a:r>
+              <a:rPr lang="pt-BR" sz="3200" dirty="0"/>
+              <a:t>O GitHub está sendo usado como base de pesquisa para avaliar a produção de um potencial candidato.</a:t>
+            </a:r>
+          </a:p>
+          <a:p>
+            <a:endParaRPr lang="pt-BR" sz="3200" dirty="0"/>
+          </a:p>
+        </p:txBody>
+      </p:sp>
+      <p:sp>
+        <p:nvSpPr>
+          <p:cNvPr id="3" name="Título 1"/>
+          <p:cNvSpPr>
+            <a:spLocks noGrp="1"/>
+          </p:cNvSpPr>
+          <p:nvPr>
+            <p:ph type="title"/>
+          </p:nvPr>
+        </p:nvSpPr>
+        <p:spPr>
+          <a:xfrm>
+            <a:off x="437883" y="11655"/>
+            <a:ext cx="8203842" cy="902745"/>
+          </a:xfrm>
+        </p:spPr>
+        <p:txBody>
+          <a:bodyPr>
+            <a:normAutofit fontScale="90000"/>
+          </a:bodyPr>
+          <a:lstStyle/>
+          <a:p>
+            <a:pPr>
+              <a:lnSpc>
+                <a:spcPct val="200000"/>
+              </a:lnSpc>
+            </a:pPr>
+            <a:r>
+              <a:rPr lang="x-none" sz="2800" b="1" dirty="0"/>
+              <a:t>HOSPEDANDO NO GITHUB</a:t>
+            </a:r>
+          </a:p>
+        </p:txBody>
+      </p:sp>
+    </p:spTree>
+    <p:extLst>
+      <p:ext uri="{BB962C8B-B14F-4D97-AF65-F5344CB8AC3E}">
+        <p14:creationId xmlns:p14="http://schemas.microsoft.com/office/powerpoint/2010/main" val="3963939415"/>
+      </p:ext>
+    </p:extLst>
+  </p:cSld>
+  <p:clrMapOvr>
+    <a:masterClrMapping/>
+  </p:clrMapOvr>
+</p:sld>
+</file>
+
+<file path=ppt/slides/slide2.xml><?xml version="1.0" encoding="utf-8"?>
 <p:sld xmlns:a="http://schemas.openxmlformats.org/drawingml/2006/main" xmlns:r="http://schemas.openxmlformats.org/officeDocument/2006/relationships" xmlns:p="http://schemas.openxmlformats.org/presentationml/2006/main" showMasterSp="0">
   <p:cSld>
     <p:bg>
@@ -3356,7 +3615,7 @@
           <p:cNvPr id="4" name="Title 1">
             <a:extLst>
               <a:ext uri="{FF2B5EF4-FFF2-40B4-BE49-F238E27FC236}">
-                <a16:creationId xmlns="" xmlns:a16="http://schemas.microsoft.com/office/drawing/2014/main" id="{854162F5-84C3-E248-B56A-B760B2963C40}"/>
+                <a16:creationId xmlns:a16="http://schemas.microsoft.com/office/drawing/2014/main" id="{854162F5-84C3-E248-B56A-B760B2963C40}"/>
               </a:ext>
             </a:extLst>
           </p:cNvPr>
@@ -3424,17 +3683,10 @@
   <p:clrMapOvr>
     <a:masterClrMapping/>
   </p:clrMapOvr>
-  <p:timing>
-    <p:tnLst>
-      <p:par>
-        <p:cTn id="1" dur="indefinite" restart="never" nodeType="tmRoot"/>
-      </p:par>
-    </p:tnLst>
-  </p:timing>
 </p:sld>
 </file>
 
-<file path=ppt/slides/slide2.xml><?xml version="1.0" encoding="utf-8"?>
+<file path=ppt/slides/slide3.xml><?xml version="1.0" encoding="utf-8"?>
 <p:sld xmlns:a="http://schemas.openxmlformats.org/drawingml/2006/main" xmlns:r="http://schemas.openxmlformats.org/officeDocument/2006/relationships" xmlns:p="http://schemas.openxmlformats.org/presentationml/2006/main" showMasterSp="0">
   <p:cSld>
     <p:bg>
@@ -3466,7 +3718,7 @@
           <p:cNvPr id="2" name="Title 1">
             <a:extLst>
               <a:ext uri="{FF2B5EF4-FFF2-40B4-BE49-F238E27FC236}">
-                <a16:creationId xmlns="" xmlns:a16="http://schemas.microsoft.com/office/drawing/2014/main" id="{73FD4F77-028A-7A47-BC41-2C419FC56E27}"/>
+                <a16:creationId xmlns:a16="http://schemas.microsoft.com/office/drawing/2014/main" id="{73FD4F77-028A-7A47-BC41-2C419FC56E27}"/>
               </a:ext>
             </a:extLst>
           </p:cNvPr>
@@ -3499,7 +3751,7 @@
           <p:cNvPr id="1026" name="Picture 2" descr="Git na prática — Parte 1 (Subindo projeto para o github).">
             <a:extLst>
               <a:ext uri="{FF2B5EF4-FFF2-40B4-BE49-F238E27FC236}">
-                <a16:creationId xmlns="" xmlns:a16="http://schemas.microsoft.com/office/drawing/2014/main" id="{C41C7762-29AF-DE4A-8B75-0AA40134A4CA}"/>
+                <a16:creationId xmlns:a16="http://schemas.microsoft.com/office/drawing/2014/main" id="{C41C7762-29AF-DE4A-8B75-0AA40134A4CA}"/>
               </a:ext>
             </a:extLst>
           </p:cNvPr>
@@ -3551,157 +3803,6 @@
   <p:clrMapOvr>
     <a:masterClrMapping/>
   </p:clrMapOvr>
-  <p:timing>
-    <p:tnLst>
-      <p:par>
-        <p:cTn id="1" dur="indefinite" restart="never" nodeType="tmRoot"/>
-      </p:par>
-    </p:tnLst>
-  </p:timing>
-</p:sld>
-</file>
-
-<file path=ppt/slides/slide3.xml><?xml version="1.0" encoding="utf-8"?>
-<p:sld xmlns:a="http://schemas.openxmlformats.org/drawingml/2006/main" xmlns:r="http://schemas.openxmlformats.org/officeDocument/2006/relationships" xmlns:p="http://schemas.openxmlformats.org/presentationml/2006/main">
-  <p:cSld>
-    <p:spTree>
-      <p:nvGrpSpPr>
-        <p:cNvPr id="1" name=""/>
-        <p:cNvGrpSpPr/>
-        <p:nvPr/>
-      </p:nvGrpSpPr>
-      <p:grpSpPr>
-        <a:xfrm>
-          <a:off x="0" y="0"/>
-          <a:ext cx="0" cy="0"/>
-          <a:chOff x="0" y="0"/>
-          <a:chExt cx="0" cy="0"/>
-        </a:xfrm>
-      </p:grpSpPr>
-      <p:sp>
-        <p:nvSpPr>
-          <p:cNvPr id="6" name="TextBox 5">
-            <a:extLst>
-              <a:ext uri="{FF2B5EF4-FFF2-40B4-BE49-F238E27FC236}">
-                <a16:creationId xmlns="" xmlns:a16="http://schemas.microsoft.com/office/drawing/2014/main" id="{D5751BA7-3065-D045-A3E0-72C84756D1B7}"/>
-              </a:ext>
-            </a:extLst>
-          </p:cNvPr>
-          <p:cNvSpPr txBox="1"/>
-          <p:nvPr/>
-        </p:nvSpPr>
-        <p:spPr>
-          <a:xfrm>
-            <a:off x="437882" y="1490680"/>
-            <a:ext cx="8401317" cy="4278094"/>
-          </a:xfrm>
-          <a:prstGeom prst="rect">
-            <a:avLst/>
-          </a:prstGeom>
-          <a:noFill/>
-        </p:spPr>
-        <p:txBody>
-          <a:bodyPr wrap="square" rtlCol="0">
-            <a:spAutoFit/>
-          </a:bodyPr>
-          <a:lstStyle/>
-          <a:p>
-            <a:pPr algn="just">
-              <a:lnSpc>
-                <a:spcPct val="200000"/>
-              </a:lnSpc>
-            </a:pPr>
-            <a:endParaRPr lang="x-none" sz="3200" dirty="0"/>
-          </a:p>
-          <a:p>
-            <a:pPr marL="342900" indent="-342900" algn="just">
-              <a:lnSpc>
-                <a:spcPct val="150000"/>
-              </a:lnSpc>
-              <a:buFont typeface="Arial" panose="020B0604020202020204" pitchFamily="34" charset="0"/>
-              <a:buChar char="•"/>
-            </a:pPr>
-            <a:r>
-              <a:rPr lang="x-none" sz="3200" dirty="0"/>
-              <a:t>Histórico ajuda a entender do começo até a última </a:t>
-            </a:r>
-            <a:r>
-              <a:rPr lang="x-none" sz="3200" dirty="0" smtClean="0"/>
-              <a:t>alteração</a:t>
-            </a:r>
-            <a:r>
-              <a:rPr lang="pt-BR" sz="3200" dirty="0" smtClean="0"/>
-              <a:t> de documentos/arquivos/fontes.</a:t>
-            </a:r>
-          </a:p>
-          <a:p>
-            <a:pPr marL="342900" indent="-342900" algn="just">
-              <a:lnSpc>
-                <a:spcPct val="200000"/>
-              </a:lnSpc>
-              <a:buFont typeface="Arial" panose="020B0604020202020204" pitchFamily="34" charset="0"/>
-              <a:buChar char="•"/>
-            </a:pPr>
-            <a:endParaRPr lang="x-none" sz="3200" dirty="0"/>
-          </a:p>
-        </p:txBody>
-      </p:sp>
-      <p:sp>
-        <p:nvSpPr>
-          <p:cNvPr id="3" name="Título 1"/>
-          <p:cNvSpPr>
-            <a:spLocks noGrp="1"/>
-          </p:cNvSpPr>
-          <p:nvPr>
-            <p:ph type="title"/>
-          </p:nvPr>
-        </p:nvSpPr>
-        <p:spPr>
-          <a:xfrm>
-            <a:off x="437883" y="11655"/>
-            <a:ext cx="8203842" cy="902745"/>
-          </a:xfrm>
-        </p:spPr>
-        <p:txBody>
-          <a:bodyPr>
-            <a:normAutofit fontScale="90000"/>
-          </a:bodyPr>
-          <a:lstStyle/>
-          <a:p>
-            <a:pPr>
-              <a:lnSpc>
-                <a:spcPct val="200000"/>
-              </a:lnSpc>
-            </a:pPr>
-            <a:r>
-              <a:rPr lang="x-none" sz="2800" b="1" dirty="0"/>
-              <a:t>MANTER O </a:t>
-            </a:r>
-            <a:r>
-              <a:rPr lang="x-none" sz="2800" b="1" dirty="0" smtClean="0"/>
-              <a:t>HISTÓRICO</a:t>
-            </a:r>
-            <a:endParaRPr lang="x-none" sz="2800" b="1" dirty="0"/>
-          </a:p>
-        </p:txBody>
-      </p:sp>
-    </p:spTree>
-    <p:extLst>
-      <p:ext uri="{BB962C8B-B14F-4D97-AF65-F5344CB8AC3E}">
-        <p14:creationId xmlns:p14="http://schemas.microsoft.com/office/powerpoint/2010/main" val="1104236657"/>
-      </p:ext>
-    </p:extLst>
-  </p:cSld>
-  <p:clrMapOvr>
-    <a:masterClrMapping/>
-  </p:clrMapOvr>
-  <p:timing>
-    <p:tnLst>
-      <p:par>
-        <p:cTn id="1" dur="indefinite" restart="never" nodeType="tmRoot"/>
-      </p:par>
-    </p:tnLst>
-  </p:timing>
 </p:sld>
 </file>
 
@@ -3727,7 +3828,7 @@
           <p:cNvPr id="6" name="TextBox 5">
             <a:extLst>
               <a:ext uri="{FF2B5EF4-FFF2-40B4-BE49-F238E27FC236}">
-                <a16:creationId xmlns="" xmlns:a16="http://schemas.microsoft.com/office/drawing/2014/main" id="{D5751BA7-3065-D045-A3E0-72C84756D1B7}"/>
+                <a16:creationId xmlns:a16="http://schemas.microsoft.com/office/drawing/2014/main" id="{D5751BA7-3065-D045-A3E0-72C84756D1B7}"/>
               </a:ext>
             </a:extLst>
           </p:cNvPr>
@@ -3736,8 +3837,8 @@
         </p:nvSpPr>
         <p:spPr>
           <a:xfrm>
-            <a:off x="437882" y="1313804"/>
-            <a:ext cx="8401317" cy="458267"/>
+            <a:off x="437882" y="1490680"/>
+            <a:ext cx="8401317" cy="4278094"/>
           </a:xfrm>
           <a:prstGeom prst="rect">
             <a:avLst/>
@@ -3755,18 +3856,34 @@
                 <a:spcPct val="200000"/>
               </a:lnSpc>
             </a:pPr>
-            <a:r>
-              <a:rPr lang="pt-BR" sz="1400" dirty="0" smtClean="0"/>
-              <a:t>Paulo Fonseca (Professor)</a:t>
-            </a:r>
-            <a:r>
-              <a:rPr lang="pt-BR" sz="1400" dirty="0"/>
-              <a:t> </a:t>
-            </a:r>
-            <a:r>
-              <a:rPr lang="pt-BR" sz="1400" smtClean="0"/>
-              <a:t>– paulo.fonseca@uniron.edu.br</a:t>
-            </a:r>
+            <a:endParaRPr lang="x-none" sz="3200" dirty="0"/>
+          </a:p>
+          <a:p>
+            <a:pPr marL="342900" indent="-342900" algn="just">
+              <a:lnSpc>
+                <a:spcPct val="150000"/>
+              </a:lnSpc>
+              <a:buFont typeface="Arial" panose="020B0604020202020204" pitchFamily="34" charset="0"/>
+              <a:buChar char="•"/>
+            </a:pPr>
+            <a:r>
+              <a:rPr lang="x-none" sz="3200" dirty="0"/>
+              <a:t>Histórico ajuda a entender do começo até a última alteração</a:t>
+            </a:r>
+            <a:r>
+              <a:rPr lang="pt-BR" sz="3200" dirty="0"/>
+              <a:t> de documentos/arquivos/fontes.</a:t>
+            </a:r>
+          </a:p>
+          <a:p>
+            <a:pPr marL="342900" indent="-342900" algn="just">
+              <a:lnSpc>
+                <a:spcPct val="200000"/>
+              </a:lnSpc>
+              <a:buFont typeface="Arial" panose="020B0604020202020204" pitchFamily="34" charset="0"/>
+              <a:buChar char="•"/>
+            </a:pPr>
+            <a:endParaRPr lang="x-none" sz="3200" dirty="0"/>
           </a:p>
         </p:txBody>
       </p:sp>
@@ -3798,30 +3915,22 @@
               </a:lnSpc>
             </a:pPr>
             <a:r>
-              <a:rPr lang="pt-BR" sz="2800" b="1" dirty="0" smtClean="0"/>
-              <a:t>integrantes do 4º. Período 2020.2</a:t>
-            </a:r>
-            <a:endParaRPr lang="x-none" sz="2800" b="1" dirty="0"/>
+              <a:rPr lang="x-none" sz="2800" b="1" dirty="0"/>
+              <a:t>MANTER O HISTÓRICO</a:t>
+            </a:r>
           </a:p>
         </p:txBody>
       </p:sp>
     </p:spTree>
     <p:extLst>
       <p:ext uri="{BB962C8B-B14F-4D97-AF65-F5344CB8AC3E}">
-        <p14:creationId xmlns:p14="http://schemas.microsoft.com/office/powerpoint/2010/main" val="3790230199"/>
+        <p14:creationId xmlns:p14="http://schemas.microsoft.com/office/powerpoint/2010/main" val="1104236657"/>
       </p:ext>
     </p:extLst>
   </p:cSld>
   <p:clrMapOvr>
     <a:masterClrMapping/>
   </p:clrMapOvr>
-  <p:timing>
-    <p:tnLst>
-      <p:par>
-        <p:cTn id="1" dur="indefinite" restart="never" nodeType="tmRoot"/>
-      </p:par>
-    </p:tnLst>
-  </p:timing>
 </p:sld>
 </file>
 
@@ -3847,7 +3956,7 @@
           <p:cNvPr id="6" name="TextBox 5">
             <a:extLst>
               <a:ext uri="{FF2B5EF4-FFF2-40B4-BE49-F238E27FC236}">
-                <a16:creationId xmlns="" xmlns:a16="http://schemas.microsoft.com/office/drawing/2014/main" id="{D5751BA7-3065-D045-A3E0-72C84756D1B7}"/>
+                <a16:creationId xmlns:a16="http://schemas.microsoft.com/office/drawing/2014/main" id="{D5751BA7-3065-D045-A3E0-72C84756D1B7}"/>
               </a:ext>
             </a:extLst>
           </p:cNvPr>
@@ -3856,8 +3965,8 @@
         </p:nvSpPr>
         <p:spPr>
           <a:xfrm>
-            <a:off x="475989" y="1213682"/>
-            <a:ext cx="8192022" cy="4770537"/>
+            <a:off x="437882" y="1313804"/>
+            <a:ext cx="8401317" cy="458267"/>
           </a:xfrm>
           <a:prstGeom prst="rect">
             <a:avLst/>
@@ -3870,58 +3979,19 @@
           </a:bodyPr>
           <a:lstStyle/>
           <a:p>
-            <a:pPr marL="457200" indent="-457200" algn="just">
-              <a:buFont typeface="Arial" panose="020B0604020202020204" pitchFamily="34" charset="0"/>
-              <a:buChar char="•"/>
-            </a:pPr>
-            <a:endParaRPr lang="pt-BR" sz="3200" dirty="0" smtClean="0"/>
-          </a:p>
-          <a:p>
-            <a:pPr marL="457200" indent="-457200" algn="just">
-              <a:buFont typeface="Arial" panose="020B0604020202020204" pitchFamily="34" charset="0"/>
-              <a:buChar char="•"/>
-            </a:pPr>
-            <a:r>
-              <a:rPr lang="pt-BR" sz="3200" dirty="0" smtClean="0"/>
-              <a:t>Muito </a:t>
-            </a:r>
-            <a:r>
-              <a:rPr lang="pt-BR" sz="3200" dirty="0"/>
-              <a:t>raramente trabalhamos sozinhos.</a:t>
-            </a:r>
-          </a:p>
-          <a:p>
-            <a:pPr marL="457200" indent="-457200" algn="just">
-              <a:buFont typeface="Arial" panose="020B0604020202020204" pitchFamily="34" charset="0"/>
-              <a:buChar char="•"/>
-            </a:pPr>
-            <a:r>
-              <a:rPr lang="pt-BR" sz="3200" dirty="0"/>
-              <a:t>Construir um sistema em equipe é um grande desafio. </a:t>
-            </a:r>
-            <a:endParaRPr lang="pt-BR" sz="3200" dirty="0" smtClean="0"/>
-          </a:p>
-          <a:p>
-            <a:pPr marL="457200" indent="-457200" algn="just">
-              <a:buFont typeface="Arial" panose="020B0604020202020204" pitchFamily="34" charset="0"/>
-              <a:buChar char="•"/>
-            </a:pPr>
-            <a:r>
-              <a:rPr lang="pt-BR" sz="3200" dirty="0" smtClean="0"/>
-              <a:t>Nosso </a:t>
-            </a:r>
-            <a:r>
-              <a:rPr lang="pt-BR" sz="3200" dirty="0"/>
-              <a:t>código tem que se integrar de maneira transparente e sem emendas com o código de todos os outros membros da nossa equipe.</a:t>
-            </a:r>
-          </a:p>
-          <a:p>
             <a:pPr algn="just">
               <a:lnSpc>
-                <a:spcPct val="150000"/>
+                <a:spcPct val="200000"/>
               </a:lnSpc>
             </a:pPr>
-            <a:endParaRPr lang="x-none" sz="3200" dirty="0"/>
+            <a:r>
+              <a:rPr lang="pt-BR" sz="1400" dirty="0"/>
+              <a:t>Paulo Fonseca (Professor) </a:t>
+            </a:r>
+            <a:r>
+              <a:rPr lang="pt-BR" sz="1400"/>
+              <a:t>– paulo.fonseca@uniron.edu.br</a:t>
+            </a:r>
           </a:p>
         </p:txBody>
       </p:sp>
@@ -3953,12 +4023,8 @@
               </a:lnSpc>
             </a:pPr>
             <a:r>
-              <a:rPr lang="x-none" sz="2800" b="1" dirty="0"/>
-              <a:t>TRABALHANDO EM </a:t>
-            </a:r>
-            <a:r>
-              <a:rPr lang="x-none" sz="2800" b="1" dirty="0" smtClean="0"/>
-              <a:t>EQUIPE</a:t>
+              <a:rPr lang="pt-BR" sz="2800" b="1" dirty="0"/>
+              <a:t>integrantes do 4º. Período 2020.2</a:t>
             </a:r>
             <a:endParaRPr lang="x-none" sz="2800" b="1" dirty="0"/>
           </a:p>
@@ -3967,20 +4033,13 @@
     </p:spTree>
     <p:extLst>
       <p:ext uri="{BB962C8B-B14F-4D97-AF65-F5344CB8AC3E}">
-        <p14:creationId xmlns:p14="http://schemas.microsoft.com/office/powerpoint/2010/main" val="3481684597"/>
+        <p14:creationId xmlns:p14="http://schemas.microsoft.com/office/powerpoint/2010/main" val="3790230199"/>
       </p:ext>
     </p:extLst>
   </p:cSld>
   <p:clrMapOvr>
     <a:masterClrMapping/>
   </p:clrMapOvr>
-  <p:timing>
-    <p:tnLst>
-      <p:par>
-        <p:cTn id="1" dur="indefinite" restart="never" nodeType="tmRoot"/>
-      </p:par>
-    </p:tnLst>
-  </p:timing>
 </p:sld>
 </file>
 
@@ -4006,7 +4065,7 @@
           <p:cNvPr id="6" name="TextBox 5">
             <a:extLst>
               <a:ext uri="{FF2B5EF4-FFF2-40B4-BE49-F238E27FC236}">
-                <a16:creationId xmlns="" xmlns:a16="http://schemas.microsoft.com/office/drawing/2014/main" id="{D5751BA7-3065-D045-A3E0-72C84756D1B7}"/>
+                <a16:creationId xmlns:a16="http://schemas.microsoft.com/office/drawing/2014/main" id="{D5751BA7-3065-D045-A3E0-72C84756D1B7}"/>
               </a:ext>
             </a:extLst>
           </p:cNvPr>
@@ -4015,8 +4074,8 @@
         </p:nvSpPr>
         <p:spPr>
           <a:xfrm>
-            <a:off x="475989" y="840919"/>
-            <a:ext cx="8192022" cy="5262979"/>
+            <a:off x="475989" y="1213682"/>
+            <a:ext cx="8192022" cy="4770537"/>
           </a:xfrm>
           <a:prstGeom prst="rect">
             <a:avLst/>
@@ -4029,142 +4088,49 @@
           </a:bodyPr>
           <a:lstStyle/>
           <a:p>
-            <a:pPr marL="342900" indent="-342900" algn="just">
+            <a:pPr marL="457200" indent="-457200" algn="just">
+              <a:buFont typeface="Arial" panose="020B0604020202020204" pitchFamily="34" charset="0"/>
+              <a:buChar char="•"/>
+            </a:pPr>
+            <a:endParaRPr lang="pt-BR" sz="3200" dirty="0"/>
+          </a:p>
+          <a:p>
+            <a:pPr marL="457200" indent="-457200" algn="just">
+              <a:buFont typeface="Arial" panose="020B0604020202020204" pitchFamily="34" charset="0"/>
+              <a:buChar char="•"/>
+            </a:pPr>
+            <a:r>
+              <a:rPr lang="pt-BR" sz="3200" dirty="0"/>
+              <a:t>Muito raramente trabalhamos sozinhos.</a:t>
+            </a:r>
+          </a:p>
+          <a:p>
+            <a:pPr marL="457200" indent="-457200" algn="just">
+              <a:buFont typeface="Arial" panose="020B0604020202020204" pitchFamily="34" charset="0"/>
+              <a:buChar char="•"/>
+            </a:pPr>
+            <a:r>
+              <a:rPr lang="pt-BR" sz="3200" dirty="0"/>
+              <a:t>Construir um sistema em equipe é um grande desafio. </a:t>
+            </a:r>
+          </a:p>
+          <a:p>
+            <a:pPr marL="457200" indent="-457200" algn="just">
+              <a:buFont typeface="Arial" panose="020B0604020202020204" pitchFamily="34" charset="0"/>
+              <a:buChar char="•"/>
+            </a:pPr>
+            <a:r>
+              <a:rPr lang="pt-BR" sz="3200" dirty="0"/>
+              <a:t>Nosso código tem que se integrar de maneira transparente e sem emendas com o código de todos os outros membros da nossa equipe.</a:t>
+            </a:r>
+          </a:p>
+          <a:p>
+            <a:pPr algn="just">
               <a:lnSpc>
                 <a:spcPct val="150000"/>
               </a:lnSpc>
-              <a:buFont typeface="Arial" panose="020B0604020202020204" pitchFamily="34" charset="0"/>
-              <a:buChar char="•"/>
             </a:pPr>
-            <a:r>
-              <a:rPr lang="x-none" sz="3200" dirty="0" smtClean="0"/>
-              <a:t>Ferramentas </a:t>
-            </a:r>
-            <a:r>
-              <a:rPr lang="x-none" sz="3200" dirty="0"/>
-              <a:t>que funcionam como máquinas do tempo e robôs de </a:t>
-            </a:r>
-            <a:r>
-              <a:rPr lang="x-none" sz="3200" dirty="0" smtClean="0"/>
-              <a:t>integração</a:t>
-            </a:r>
-            <a:r>
-              <a:rPr lang="pt-BR" sz="3200" dirty="0" smtClean="0"/>
-              <a:t> dos documentos</a:t>
-            </a:r>
-            <a:r>
-              <a:rPr lang="x-none" sz="3200" dirty="0" smtClean="0"/>
-              <a:t>;</a:t>
-            </a:r>
             <a:endParaRPr lang="x-none" sz="3200" dirty="0"/>
-          </a:p>
-          <a:p>
-            <a:pPr marL="342900" indent="-342900" algn="just">
-              <a:lnSpc>
-                <a:spcPct val="150000"/>
-              </a:lnSpc>
-              <a:buFont typeface="Arial" panose="020B0604020202020204" pitchFamily="34" charset="0"/>
-              <a:buChar char="•"/>
-            </a:pPr>
-            <a:r>
-              <a:rPr lang="x-none" sz="3200" dirty="0"/>
-              <a:t>Mostra todo o </a:t>
-            </a:r>
-            <a:r>
-              <a:rPr lang="x-none" sz="3200" dirty="0" smtClean="0"/>
-              <a:t>histórico</a:t>
-            </a:r>
-            <a:r>
-              <a:rPr lang="pt-BR" sz="3200" dirty="0" smtClean="0"/>
-              <a:t> do documento</a:t>
-            </a:r>
-            <a:r>
-              <a:rPr lang="x-none" sz="3200" dirty="0" smtClean="0"/>
-              <a:t>;</a:t>
-            </a:r>
-            <a:endParaRPr lang="x-none" sz="3200" dirty="0"/>
-          </a:p>
-          <a:p>
-            <a:pPr marL="342900" indent="-342900" algn="just">
-              <a:lnSpc>
-                <a:spcPct val="150000"/>
-              </a:lnSpc>
-              <a:buFont typeface="Arial" panose="020B0604020202020204" pitchFamily="34" charset="0"/>
-              <a:buChar char="•"/>
-            </a:pPr>
-            <a:r>
-              <a:rPr lang="x-none" sz="3200" dirty="0"/>
-              <a:t>Possui um </a:t>
-            </a:r>
-            <a:r>
-              <a:rPr lang="x-none" sz="3200" dirty="0" smtClean="0"/>
-              <a:t>repositório.</a:t>
-            </a:r>
-            <a:endParaRPr lang="pt-BR" sz="3200" dirty="0" smtClean="0"/>
-          </a:p>
-          <a:p>
-            <a:pPr marL="342900" indent="-342900" algn="just">
-              <a:lnSpc>
-                <a:spcPct val="150000"/>
-              </a:lnSpc>
-              <a:buFont typeface="Arial" panose="020B0604020202020204" pitchFamily="34" charset="0"/>
-              <a:buChar char="•"/>
-            </a:pPr>
-            <a:r>
-              <a:rPr lang="pt-BR" sz="3200" i="1" dirty="0" smtClean="0"/>
-              <a:t>CVS</a:t>
-            </a:r>
-            <a:r>
-              <a:rPr lang="pt-BR" sz="3200" i="1" dirty="0"/>
-              <a:t>, </a:t>
-            </a:r>
-            <a:r>
-              <a:rPr lang="pt-BR" sz="3200" i="1" dirty="0" err="1"/>
-              <a:t>ClearCase</a:t>
-            </a:r>
-            <a:r>
-              <a:rPr lang="pt-BR" sz="3200" i="1" dirty="0"/>
-              <a:t>, </a:t>
-            </a:r>
-            <a:r>
-              <a:rPr lang="pt-BR" sz="3200" i="1" dirty="0" err="1"/>
-              <a:t>Source-Safe</a:t>
-            </a:r>
-            <a:r>
-              <a:rPr lang="pt-BR" sz="3200" i="1" dirty="0"/>
-              <a:t> e SVN </a:t>
-            </a:r>
-            <a:endParaRPr lang="pt-BR" sz="3200" i="1" dirty="0" smtClean="0"/>
-          </a:p>
-          <a:p>
-            <a:pPr marL="342900" indent="-342900" algn="just">
-              <a:lnSpc>
-                <a:spcPct val="150000"/>
-              </a:lnSpc>
-              <a:buFont typeface="Arial" panose="020B0604020202020204" pitchFamily="34" charset="0"/>
-              <a:buChar char="•"/>
-            </a:pPr>
-            <a:r>
-              <a:rPr lang="pt-BR" sz="3200" b="1" dirty="0"/>
-              <a:t>Mercurial, </a:t>
-            </a:r>
-            <a:r>
-              <a:rPr lang="pt-BR" sz="3200" b="1" dirty="0" err="1"/>
-              <a:t>Bazaar</a:t>
-            </a:r>
-            <a:r>
-              <a:rPr lang="pt-BR" sz="3200" b="1" dirty="0"/>
-              <a:t> e, é claro, </a:t>
-            </a:r>
-            <a:r>
-              <a:rPr lang="pt-BR" sz="3200" b="1" dirty="0" err="1" smtClean="0"/>
-              <a:t>Git</a:t>
-            </a:r>
-            <a:r>
-              <a:rPr lang="pt-BR" sz="3200" b="1" dirty="0" smtClean="0"/>
-              <a:t>.</a:t>
-            </a:r>
-            <a:endParaRPr lang="x-none" sz="3200" b="1" dirty="0"/>
           </a:p>
         </p:txBody>
       </p:sp>
@@ -4197,33 +4163,21 @@
             </a:pPr>
             <a:r>
               <a:rPr lang="x-none" sz="2800" b="1" dirty="0"/>
-              <a:t>SISTEMAS DE CONTROLE DE </a:t>
-            </a:r>
-            <a:r>
-              <a:rPr lang="x-none" sz="2800" b="1" dirty="0" smtClean="0"/>
-              <a:t>VERSÃO</a:t>
-            </a:r>
-            <a:endParaRPr lang="x-none" sz="2800" b="1" dirty="0"/>
+              <a:t>TRABALHANDO EM EQUIPE</a:t>
+            </a:r>
           </a:p>
         </p:txBody>
       </p:sp>
     </p:spTree>
     <p:extLst>
       <p:ext uri="{BB962C8B-B14F-4D97-AF65-F5344CB8AC3E}">
-        <p14:creationId xmlns:p14="http://schemas.microsoft.com/office/powerpoint/2010/main" val="136320135"/>
+        <p14:creationId xmlns:p14="http://schemas.microsoft.com/office/powerpoint/2010/main" val="3481684597"/>
       </p:ext>
     </p:extLst>
   </p:cSld>
   <p:clrMapOvr>
     <a:masterClrMapping/>
   </p:clrMapOvr>
-  <p:timing>
-    <p:tnLst>
-      <p:par>
-        <p:cTn id="1" dur="indefinite" restart="never" nodeType="tmRoot"/>
-      </p:par>
-    </p:tnLst>
-  </p:timing>
 </p:sld>
 </file>
 
@@ -4249,7 +4203,7 @@
           <p:cNvPr id="6" name="TextBox 5">
             <a:extLst>
               <a:ext uri="{FF2B5EF4-FFF2-40B4-BE49-F238E27FC236}">
-                <a16:creationId xmlns="" xmlns:a16="http://schemas.microsoft.com/office/drawing/2014/main" id="{D5751BA7-3065-D045-A3E0-72C84756D1B7}"/>
+                <a16:creationId xmlns:a16="http://schemas.microsoft.com/office/drawing/2014/main" id="{D5751BA7-3065-D045-A3E0-72C84756D1B7}"/>
               </a:ext>
             </a:extLst>
           </p:cNvPr>
@@ -4259,7 +4213,7 @@
         <p:spPr>
           <a:xfrm>
             <a:off x="475989" y="840919"/>
-            <a:ext cx="8192022" cy="4524315"/>
+            <a:ext cx="8192022" cy="5262979"/>
           </a:xfrm>
           <a:prstGeom prst="rect">
             <a:avLst/>
@@ -4271,14 +4225,6 @@
             <a:spAutoFit/>
           </a:bodyPr>
           <a:lstStyle/>
-          <a:p>
-            <a:pPr algn="just">
-              <a:lnSpc>
-                <a:spcPct val="150000"/>
-              </a:lnSpc>
-            </a:pPr>
-            <a:endParaRPr lang="x-none" sz="3200" dirty="0" smtClean="0"/>
-          </a:p>
           <a:p>
             <a:pPr marL="342900" indent="-342900" algn="just">
               <a:lnSpc>
@@ -4288,8 +4234,16 @@
               <a:buChar char="•"/>
             </a:pPr>
             <a:r>
-              <a:rPr lang="x-none" sz="3200" dirty="0" smtClean="0"/>
-              <a:t>Criado em 2005 por Linus Torvalds, após se mostrar descontente com o BitKeeper, ferramenta utilizada anteriormente para versionamento do kernel Linux;</a:t>
+              <a:rPr lang="x-none" sz="3200" dirty="0"/>
+              <a:t>Ferramentas que funcionam como máquinas do tempo e robôs de integração</a:t>
+            </a:r>
+            <a:r>
+              <a:rPr lang="pt-BR" sz="3200" dirty="0"/>
+              <a:t> dos documentos</a:t>
+            </a:r>
+            <a:r>
+              <a:rPr lang="x-none" sz="3200" dirty="0"/>
+              <a:t>;</a:t>
             </a:r>
           </a:p>
           <a:p>
@@ -4301,19 +4255,96 @@
               <a:buChar char="•"/>
             </a:pPr>
             <a:r>
-              <a:rPr lang="x-none" sz="3200" dirty="0" smtClean="0"/>
-              <a:t>Utilizado </a:t>
-            </a:r>
-            <a:r>
               <a:rPr lang="x-none" sz="3200" dirty="0"/>
-              <a:t>amplamente em todo o mundo.</a:t>
-            </a:r>
-          </a:p>
-        </p:txBody>
-      </p:sp>
-      <p:sp>
-        <p:nvSpPr>
-          <p:cNvPr id="4" name="Título 1"/>
+              <a:t>Mostra todo o histórico</a:t>
+            </a:r>
+            <a:r>
+              <a:rPr lang="pt-BR" sz="3200" dirty="0"/>
+              <a:t> do documento</a:t>
+            </a:r>
+            <a:r>
+              <a:rPr lang="x-none" sz="3200" dirty="0"/>
+              <a:t>;</a:t>
+            </a:r>
+          </a:p>
+          <a:p>
+            <a:pPr marL="342900" indent="-342900" algn="just">
+              <a:lnSpc>
+                <a:spcPct val="150000"/>
+              </a:lnSpc>
+              <a:buFont typeface="Arial" panose="020B0604020202020204" pitchFamily="34" charset="0"/>
+              <a:buChar char="•"/>
+            </a:pPr>
+            <a:r>
+              <a:rPr lang="x-none" sz="3200" dirty="0"/>
+              <a:t>Possui um repositório.</a:t>
+            </a:r>
+            <a:endParaRPr lang="pt-BR" sz="3200" dirty="0"/>
+          </a:p>
+          <a:p>
+            <a:pPr marL="342900" indent="-342900" algn="just">
+              <a:lnSpc>
+                <a:spcPct val="150000"/>
+              </a:lnSpc>
+              <a:buFont typeface="Arial" panose="020B0604020202020204" pitchFamily="34" charset="0"/>
+              <a:buChar char="•"/>
+            </a:pPr>
+            <a:r>
+              <a:rPr lang="pt-BR" sz="3200" i="1" dirty="0"/>
+              <a:t>CVS, </a:t>
+            </a:r>
+            <a:r>
+              <a:rPr lang="pt-BR" sz="3200" i="1" dirty="0" err="1"/>
+              <a:t>ClearCase</a:t>
+            </a:r>
+            <a:r>
+              <a:rPr lang="pt-BR" sz="3200" i="1" dirty="0"/>
+              <a:t>, </a:t>
+            </a:r>
+            <a:r>
+              <a:rPr lang="pt-BR" sz="3200" i="1" dirty="0" err="1"/>
+              <a:t>Source-Safe</a:t>
+            </a:r>
+            <a:r>
+              <a:rPr lang="pt-BR" sz="3200" i="1" dirty="0"/>
+              <a:t> e SVN </a:t>
+            </a:r>
+          </a:p>
+          <a:p>
+            <a:pPr marL="342900" indent="-342900" algn="just">
+              <a:lnSpc>
+                <a:spcPct val="150000"/>
+              </a:lnSpc>
+              <a:buFont typeface="Arial" panose="020B0604020202020204" pitchFamily="34" charset="0"/>
+              <a:buChar char="•"/>
+            </a:pPr>
+            <a:r>
+              <a:rPr lang="pt-BR" sz="3200" b="1" dirty="0"/>
+              <a:t>Mercurial, </a:t>
+            </a:r>
+            <a:r>
+              <a:rPr lang="pt-BR" sz="3200" b="1" dirty="0" err="1"/>
+              <a:t>Bazaar</a:t>
+            </a:r>
+            <a:r>
+              <a:rPr lang="pt-BR" sz="3200" b="1" dirty="0"/>
+              <a:t> e, é claro, </a:t>
+            </a:r>
+            <a:r>
+              <a:rPr lang="pt-BR" sz="3200" b="1" dirty="0" err="1"/>
+              <a:t>Git</a:t>
+            </a:r>
+            <a:r>
+              <a:rPr lang="pt-BR" sz="3200" b="1" dirty="0"/>
+              <a:t>.</a:t>
+            </a:r>
+            <a:endParaRPr lang="x-none" sz="3200" b="1" dirty="0"/>
+          </a:p>
+        </p:txBody>
+      </p:sp>
+      <p:sp>
+        <p:nvSpPr>
+          <p:cNvPr id="3" name="Título 1"/>
           <p:cNvSpPr>
             <a:spLocks noGrp="1"/>
           </p:cNvSpPr>
@@ -4339,30 +4370,22 @@
               </a:lnSpc>
             </a:pPr>
             <a:r>
-              <a:rPr lang="x-none" sz="2800" b="1" dirty="0" smtClean="0"/>
-              <a:t>GIT</a:t>
-            </a:r>
-            <a:endParaRPr lang="x-none" sz="2800" b="1" dirty="0"/>
+              <a:rPr lang="x-none" sz="2800" b="1" dirty="0"/>
+              <a:t>SISTEMAS DE CONTROLE DE VERSÃO</a:t>
+            </a:r>
           </a:p>
         </p:txBody>
       </p:sp>
     </p:spTree>
     <p:extLst>
       <p:ext uri="{BB962C8B-B14F-4D97-AF65-F5344CB8AC3E}">
-        <p14:creationId xmlns:p14="http://schemas.microsoft.com/office/powerpoint/2010/main" val="1502040706"/>
+        <p14:creationId xmlns:p14="http://schemas.microsoft.com/office/powerpoint/2010/main" val="136320135"/>
       </p:ext>
     </p:extLst>
   </p:cSld>
   <p:clrMapOvr>
     <a:masterClrMapping/>
   </p:clrMapOvr>
-  <p:timing>
-    <p:tnLst>
-      <p:par>
-        <p:cTn id="1" dur="indefinite" restart="never" nodeType="tmRoot"/>
-      </p:par>
-    </p:tnLst>
-  </p:timing>
 </p:sld>
 </file>
 
@@ -4388,7 +4411,7 @@
           <p:cNvPr id="6" name="TextBox 5">
             <a:extLst>
               <a:ext uri="{FF2B5EF4-FFF2-40B4-BE49-F238E27FC236}">
-                <a16:creationId xmlns="" xmlns:a16="http://schemas.microsoft.com/office/drawing/2014/main" id="{D5751BA7-3065-D045-A3E0-72C84756D1B7}"/>
+                <a16:creationId xmlns:a16="http://schemas.microsoft.com/office/drawing/2014/main" id="{D5751BA7-3065-D045-A3E0-72C84756D1B7}"/>
               </a:ext>
             </a:extLst>
           </p:cNvPr>
@@ -4397,8 +4420,8 @@
         </p:nvSpPr>
         <p:spPr>
           <a:xfrm>
-            <a:off x="475988" y="840919"/>
-            <a:ext cx="8577859" cy="4524315"/>
+            <a:off x="475989" y="840919"/>
+            <a:ext cx="8192022" cy="4524315"/>
           </a:xfrm>
           <a:prstGeom prst="rect">
             <a:avLst/>
@@ -4416,7 +4439,7 @@
                 <a:spcPct val="150000"/>
               </a:lnSpc>
             </a:pPr>
-            <a:endParaRPr lang="x-none" sz="3200" b="1" dirty="0"/>
+            <a:endParaRPr lang="x-none" sz="3200" dirty="0"/>
           </a:p>
           <a:p>
             <a:pPr marL="342900" indent="-342900" algn="just">
@@ -4427,12 +4450,8 @@
               <a:buChar char="•"/>
             </a:pPr>
             <a:r>
-              <a:rPr lang="x-none" sz="3200" dirty="0" smtClean="0"/>
-              <a:t>Aplicação </a:t>
-            </a:r>
-            <a:r>
               <a:rPr lang="x-none" sz="3200" dirty="0"/>
-              <a:t>Web criada em 2008 que permite a hospedagem de repositórios Git;</a:t>
+              <a:t>Criado em 2005 por Linus Torvalds, após se mostrar descontente com o BitKeeper, ferramenta utilizada anteriormente para versionamento do kernel Linux;</a:t>
             </a:r>
           </a:p>
           <a:p>
@@ -4445,27 +4464,14 @@
             </a:pPr>
             <a:r>
               <a:rPr lang="x-none" sz="3200" dirty="0"/>
-              <a:t>Atua também como uma rede social;</a:t>
-            </a:r>
-          </a:p>
-          <a:p>
-            <a:pPr marL="342900" indent="-342900" algn="just">
-              <a:lnSpc>
-                <a:spcPct val="150000"/>
-              </a:lnSpc>
-              <a:buFont typeface="Arial" panose="020B0604020202020204" pitchFamily="34" charset="0"/>
-              <a:buChar char="•"/>
-            </a:pPr>
-            <a:r>
-              <a:rPr lang="x-none" sz="3200" dirty="0"/>
-              <a:t>Possui atualmente uma grande parte de projetos de códigos abertos.</a:t>
-            </a:r>
-          </a:p>
-        </p:txBody>
-      </p:sp>
-      <p:sp>
-        <p:nvSpPr>
-          <p:cNvPr id="3" name="Título 1"/>
+              <a:t>Utilizado amplamente em todo o mundo.</a:t>
+            </a:r>
+          </a:p>
+        </p:txBody>
+      </p:sp>
+      <p:sp>
+        <p:nvSpPr>
+          <p:cNvPr id="4" name="Título 1"/>
           <p:cNvSpPr>
             <a:spLocks noGrp="1"/>
           </p:cNvSpPr>
@@ -4492,15 +4498,7 @@
             </a:pPr>
             <a:r>
               <a:rPr lang="x-none" sz="2800" b="1" dirty="0"/>
-              <a:t>HOSPEDANDO </a:t>
-            </a:r>
-            <a:r>
-              <a:rPr lang="x-none" sz="2800" b="1" dirty="0" smtClean="0"/>
-              <a:t>NO </a:t>
-            </a:r>
-            <a:r>
-              <a:rPr lang="x-none" sz="2800" b="1" dirty="0"/>
-              <a:t>GITHUB</a:t>
+              <a:t>GIT</a:t>
             </a:r>
           </a:p>
         </p:txBody>
@@ -4508,20 +4506,13 @@
     </p:spTree>
     <p:extLst>
       <p:ext uri="{BB962C8B-B14F-4D97-AF65-F5344CB8AC3E}">
-        <p14:creationId xmlns:p14="http://schemas.microsoft.com/office/powerpoint/2010/main" val="1132454803"/>
+        <p14:creationId xmlns:p14="http://schemas.microsoft.com/office/powerpoint/2010/main" val="1502040706"/>
       </p:ext>
     </p:extLst>
   </p:cSld>
   <p:clrMapOvr>
     <a:masterClrMapping/>
   </p:clrMapOvr>
-  <p:timing>
-    <p:tnLst>
-      <p:par>
-        <p:cTn id="1" dur="indefinite" restart="never" nodeType="tmRoot"/>
-      </p:par>
-    </p:tnLst>
-  </p:timing>
 </p:sld>
 </file>
 
@@ -4547,7 +4538,7 @@
           <p:cNvPr id="6" name="TextBox 5">
             <a:extLst>
               <a:ext uri="{FF2B5EF4-FFF2-40B4-BE49-F238E27FC236}">
-                <a16:creationId xmlns="" xmlns:a16="http://schemas.microsoft.com/office/drawing/2014/main" id="{D5751BA7-3065-D045-A3E0-72C84756D1B7}"/>
+                <a16:creationId xmlns:a16="http://schemas.microsoft.com/office/drawing/2014/main" id="{D5751BA7-3065-D045-A3E0-72C84756D1B7}"/>
               </a:ext>
             </a:extLst>
           </p:cNvPr>
@@ -4557,7 +4548,7 @@
         <p:spPr>
           <a:xfrm>
             <a:off x="475988" y="840919"/>
-            <a:ext cx="8577859" cy="4770537"/>
+            <a:ext cx="8577859" cy="4524315"/>
           </a:xfrm>
           <a:prstGeom prst="rect">
             <a:avLst/>
@@ -4578,50 +4569,43 @@
             <a:endParaRPr lang="x-none" sz="3200" b="1" dirty="0"/>
           </a:p>
           <a:p>
-            <a:pPr marL="457200" indent="-457200">
+            <a:pPr marL="342900" indent="-342900" algn="just">
+              <a:lnSpc>
+                <a:spcPct val="150000"/>
+              </a:lnSpc>
               <a:buFont typeface="Arial" panose="020B0604020202020204" pitchFamily="34" charset="0"/>
               <a:buChar char="•"/>
             </a:pPr>
             <a:r>
-              <a:rPr lang="pt-BR" sz="3200" dirty="0"/>
-              <a:t>Atualmente, conhecer bem como utilizar o </a:t>
-            </a:r>
-            <a:r>
-              <a:rPr lang="pt-BR" sz="3200" dirty="0" err="1"/>
-              <a:t>Git</a:t>
-            </a:r>
-            <a:r>
-              <a:rPr lang="pt-BR" sz="3200" dirty="0"/>
-              <a:t> é uma habilidade importante para uma carreira bem-sucedida no desenvolvimento de </a:t>
-            </a:r>
-            <a:r>
-              <a:rPr lang="pt-BR" sz="3200"/>
-              <a:t>software</a:t>
-            </a:r>
-            <a:r>
-              <a:rPr lang="pt-BR" sz="3200" smtClean="0"/>
-              <a:t>.</a:t>
-            </a:r>
-          </a:p>
-          <a:p>
-            <a:pPr marL="457200" indent="-457200">
+              <a:rPr lang="x-none" sz="3200" dirty="0"/>
+              <a:t>Aplicação Web criada em 2008 que permite a hospedagem de repositórios Git;</a:t>
+            </a:r>
+          </a:p>
+          <a:p>
+            <a:pPr marL="342900" indent="-342900" algn="just">
+              <a:lnSpc>
+                <a:spcPct val="150000"/>
+              </a:lnSpc>
               <a:buFont typeface="Arial" panose="020B0604020202020204" pitchFamily="34" charset="0"/>
               <a:buChar char="•"/>
             </a:pPr>
-            <a:endParaRPr lang="pt-BR" sz="3200" dirty="0" smtClean="0"/>
-          </a:p>
-          <a:p>
-            <a:pPr marL="457200" indent="-457200" algn="just">
+            <a:r>
+              <a:rPr lang="x-none" sz="3200" dirty="0"/>
+              <a:t>Atua também como uma rede social;</a:t>
+            </a:r>
+          </a:p>
+          <a:p>
+            <a:pPr marL="342900" indent="-342900" algn="just">
+              <a:lnSpc>
+                <a:spcPct val="150000"/>
+              </a:lnSpc>
               <a:buFont typeface="Arial" panose="020B0604020202020204" pitchFamily="34" charset="0"/>
               <a:buChar char="•"/>
             </a:pPr>
             <a:r>
-              <a:rPr lang="pt-BR" sz="3200" dirty="0" smtClean="0"/>
-              <a:t>O GitHub está sendo usado como base de pesquisa para avaliar a produção de um potencial candidato.</a:t>
-            </a:r>
-          </a:p>
-          <a:p>
-            <a:endParaRPr lang="pt-BR" sz="3200" dirty="0"/>
+              <a:rPr lang="x-none" sz="3200" dirty="0"/>
+              <a:t>Possui atualmente uma grande parte de projetos de códigos abertos.</a:t>
+            </a:r>
           </a:p>
         </p:txBody>
       </p:sp>
@@ -4654,15 +4638,7 @@
             </a:pPr>
             <a:r>
               <a:rPr lang="x-none" sz="2800" b="1" dirty="0"/>
-              <a:t>HOSPEDANDO </a:t>
-            </a:r>
-            <a:r>
-              <a:rPr lang="x-none" sz="2800" b="1" dirty="0" smtClean="0"/>
-              <a:t>NO </a:t>
-            </a:r>
-            <a:r>
-              <a:rPr lang="x-none" sz="2800" b="1" dirty="0"/>
-              <a:t>GITHUB</a:t>
+              <a:t>HOSPEDANDO NO GITHUB</a:t>
             </a:r>
           </a:p>
         </p:txBody>
@@ -4670,20 +4646,13 @@
     </p:spTree>
     <p:extLst>
       <p:ext uri="{BB962C8B-B14F-4D97-AF65-F5344CB8AC3E}">
-        <p14:creationId xmlns:p14="http://schemas.microsoft.com/office/powerpoint/2010/main" val="3963939415"/>
+        <p14:creationId xmlns:p14="http://schemas.microsoft.com/office/powerpoint/2010/main" val="1132454803"/>
       </p:ext>
     </p:extLst>
   </p:cSld>
   <p:clrMapOvr>
     <a:masterClrMapping/>
   </p:clrMapOvr>
-  <p:timing>
-    <p:tnLst>
-      <p:par>
-        <p:cTn id="1" dur="indefinite" restart="never" nodeType="tmRoot"/>
-      </p:par>
-    </p:tnLst>
-  </p:timing>
 </p:sld>
 </file>
 

</xml_diff>

<commit_message>
Acrescentado nome do Marcos
</commit_message>
<xml_diff>
--- a/Controlando versões com Git e Github - Capítulo I.pptx
+++ b/Controlando versões com Git e Github - Capítulo I.pptx
@@ -285,7 +285,7 @@
             <a:fld id="{08B9EBBA-996F-894A-B54A-D6246ED52CEA}" type="datetimeFigureOut">
               <a:rPr lang="en-US" smtClean="0"/>
               <a:pPr/>
-              <a:t>10/10/2020</a:t>
+              <a:t>10/13/2020</a:t>
             </a:fld>
             <a:endParaRPr lang="en-US" dirty="0"/>
           </a:p>
@@ -457,7 +457,7 @@
             <a:fld id="{C6C52C72-DE31-F449-A4ED-4C594FD91407}" type="datetimeFigureOut">
               <a:rPr lang="en-US" smtClean="0"/>
               <a:pPr/>
-              <a:t>10/10/2020</a:t>
+              <a:t>10/13/2020</a:t>
             </a:fld>
             <a:endParaRPr lang="en-US" dirty="0"/>
           </a:p>
@@ -639,7 +639,7 @@
             <a:fld id="{ED62726E-379B-B349-9EED-81ED093FA806}" type="datetimeFigureOut">
               <a:rPr lang="en-US" smtClean="0"/>
               <a:pPr/>
-              <a:t>10/10/2020</a:t>
+              <a:t>10/13/2020</a:t>
             </a:fld>
             <a:endParaRPr lang="en-US" dirty="0"/>
           </a:p>
@@ -811,7 +811,7 @@
             <a:fld id="{9B3A1323-8D79-1946-B0D7-40001CF92E9D}" type="datetimeFigureOut">
               <a:rPr lang="en-US" smtClean="0"/>
               <a:pPr/>
-              <a:t>10/10/2020</a:t>
+              <a:t>10/13/2020</a:t>
             </a:fld>
             <a:endParaRPr lang="en-US" dirty="0"/>
           </a:p>
@@ -1081,7 +1081,7 @@
             <a:fld id="{8DFA1846-DA80-1C48-A609-854EA85C59AD}" type="datetimeFigureOut">
               <a:rPr lang="en-US" smtClean="0"/>
               <a:pPr/>
-              <a:t>10/10/2020</a:t>
+              <a:t>10/13/2020</a:t>
             </a:fld>
             <a:endParaRPr lang="en-US" dirty="0"/>
           </a:p>
@@ -1315,7 +1315,7 @@
             <a:fld id="{57302355-E14B-8545-A8F8-0FE83CC9D524}" type="datetimeFigureOut">
               <a:rPr lang="en-US" smtClean="0"/>
               <a:pPr/>
-              <a:t>10/10/2020</a:t>
+              <a:t>10/13/2020</a:t>
             </a:fld>
             <a:endParaRPr lang="en-US" dirty="0"/>
           </a:p>
@@ -1676,7 +1676,7 @@
             <a:fld id="{09B482E8-6E0E-1B4F-B1FD-C69DB9E858D9}" type="datetimeFigureOut">
               <a:rPr lang="en-US" smtClean="0"/>
               <a:pPr/>
-              <a:t>10/10/2020</a:t>
+              <a:t>10/13/2020</a:t>
             </a:fld>
             <a:endParaRPr lang="en-US" dirty="0"/>
           </a:p>
@@ -1820,7 +1820,7 @@
             <a:fld id="{F13A34C8-038E-2045-AF43-DF7DBB8E0E9E}" type="datetimeFigureOut">
               <a:rPr lang="en-US" smtClean="0"/>
               <a:pPr/>
-              <a:t>10/10/2020</a:t>
+              <a:t>10/13/2020</a:t>
             </a:fld>
             <a:endParaRPr lang="en-US" dirty="0"/>
           </a:p>
@@ -1917,7 +1917,7 @@
             <a:fld id="{8818C68F-D26B-8F47-958C-23B49CF8A634}" type="datetimeFigureOut">
               <a:rPr lang="en-US" smtClean="0"/>
               <a:pPr/>
-              <a:t>10/10/2020</a:t>
+              <a:t>10/13/2020</a:t>
             </a:fld>
             <a:endParaRPr lang="en-US" dirty="0"/>
           </a:p>
@@ -2276,7 +2276,7 @@
             <a:fld id="{D0DF5E60-9974-AC48-9591-99C2BB44B7CF}" type="datetimeFigureOut">
               <a:rPr lang="en-US" smtClean="0"/>
               <a:pPr/>
-              <a:t>10/10/2020</a:t>
+              <a:t>10/13/2020</a:t>
             </a:fld>
             <a:endParaRPr lang="en-US" dirty="0"/>
           </a:p>
@@ -2637,7 +2637,7 @@
             <a:fld id="{09B482E8-6E0E-1B4F-B1FD-C69DB9E858D9}" type="datetimeFigureOut">
               <a:rPr lang="en-US" smtClean="0"/>
               <a:pPr/>
-              <a:t>10/10/2020</a:t>
+              <a:t>10/13/2020</a:t>
             </a:fld>
             <a:endParaRPr lang="en-US" dirty="0"/>
           </a:p>
@@ -2884,7 +2884,7 @@
             <a:fld id="{09B482E8-6E0E-1B4F-B1FD-C69DB9E858D9}" type="datetimeFigureOut">
               <a:rPr lang="en-US" smtClean="0"/>
               <a:pPr/>
-              <a:t>10/10/2020</a:t>
+              <a:t>10/13/2020</a:t>
             </a:fld>
             <a:endParaRPr lang="en-US" dirty="0"/>
           </a:p>
@@ -3343,7 +3343,7 @@
           <p:cNvPr id="2" name="Título 1">
             <a:extLst>
               <a:ext uri="{FF2B5EF4-FFF2-40B4-BE49-F238E27FC236}">
-                <a16:creationId xmlns:a16="http://schemas.microsoft.com/office/drawing/2014/main" id="{E2AED92C-68A4-44C0-9741-B66CE0D03E9E}"/>
+                <a16:creationId xmlns:a16="http://schemas.microsoft.com/office/drawing/2014/main" xmlns="" id="{E2AED92C-68A4-44C0-9741-B66CE0D03E9E}"/>
               </a:ext>
             </a:extLst>
           </p:cNvPr>
@@ -3376,7 +3376,7 @@
           <p:cNvPr id="3" name="Espaço Reservado para Conteúdo 2">
             <a:extLst>
               <a:ext uri="{FF2B5EF4-FFF2-40B4-BE49-F238E27FC236}">
-                <a16:creationId xmlns:a16="http://schemas.microsoft.com/office/drawing/2014/main" id="{3ECF6D10-121E-4096-8B6B-76216617403F}"/>
+                <a16:creationId xmlns:a16="http://schemas.microsoft.com/office/drawing/2014/main" xmlns="" id="{3ECF6D10-121E-4096-8B6B-76216617403F}"/>
               </a:ext>
             </a:extLst>
           </p:cNvPr>
@@ -3394,27 +3394,24 @@
           <a:p>
             <a:r>
               <a:rPr lang="pt-BR" dirty="0"/>
-              <a:t>Marcos José dos Santos</a:t>
-            </a:r>
-          </a:p>
-          <a:p>
-            <a:r>
-              <a:rPr lang="pt-BR">
+              <a:t>Marcos José </a:t>
+            </a:r>
+            <a:r>
+              <a:rPr lang="pt-BR"/>
+              <a:t>dos </a:t>
+            </a:r>
+            <a:r>
+              <a:rPr lang="pt-BR" smtClean="0"/>
+              <a:t>Santos - </a:t>
+            </a:r>
+            <a:r>
+              <a:rPr lang="pt-BR" smtClean="0">
                 <a:solidFill>
                   <a:srgbClr val="3C4043"/>
                 </a:solidFill>
                 <a:effectLst/>
               </a:rPr>
-              <a:t>marcosjsantos48</a:t>
-            </a:r>
-            <a:r>
-              <a:rPr lang="pt-BR" dirty="0">
-                <a:solidFill>
-                  <a:srgbClr val="3C4043"/>
-                </a:solidFill>
-                <a:effectLst/>
-              </a:rPr>
-              <a:t>@gmail.com</a:t>
+              <a:t>marcosjsantos48@gmail.com</a:t>
             </a:r>
             <a:endParaRPr lang="pt-BR" dirty="0"/>
           </a:p>
@@ -3458,7 +3455,7 @@
           <p:cNvPr id="6" name="TextBox 5">
             <a:extLst>
               <a:ext uri="{FF2B5EF4-FFF2-40B4-BE49-F238E27FC236}">
-                <a16:creationId xmlns:a16="http://schemas.microsoft.com/office/drawing/2014/main" id="{D5751BA7-3065-D045-A3E0-72C84756D1B7}"/>
+                <a16:creationId xmlns:a16="http://schemas.microsoft.com/office/drawing/2014/main" xmlns="" id="{D5751BA7-3065-D045-A3E0-72C84756D1B7}"/>
               </a:ext>
             </a:extLst>
           </p:cNvPr>
@@ -3615,7 +3612,7 @@
           <p:cNvPr id="4" name="Title 1">
             <a:extLst>
               <a:ext uri="{FF2B5EF4-FFF2-40B4-BE49-F238E27FC236}">
-                <a16:creationId xmlns:a16="http://schemas.microsoft.com/office/drawing/2014/main" id="{854162F5-84C3-E248-B56A-B760B2963C40}"/>
+                <a16:creationId xmlns:a16="http://schemas.microsoft.com/office/drawing/2014/main" xmlns="" id="{854162F5-84C3-E248-B56A-B760B2963C40}"/>
               </a:ext>
             </a:extLst>
           </p:cNvPr>
@@ -3718,7 +3715,7 @@
           <p:cNvPr id="2" name="Title 1">
             <a:extLst>
               <a:ext uri="{FF2B5EF4-FFF2-40B4-BE49-F238E27FC236}">
-                <a16:creationId xmlns:a16="http://schemas.microsoft.com/office/drawing/2014/main" id="{73FD4F77-028A-7A47-BC41-2C419FC56E27}"/>
+                <a16:creationId xmlns:a16="http://schemas.microsoft.com/office/drawing/2014/main" xmlns="" id="{73FD4F77-028A-7A47-BC41-2C419FC56E27}"/>
               </a:ext>
             </a:extLst>
           </p:cNvPr>
@@ -3751,7 +3748,7 @@
           <p:cNvPr id="1026" name="Picture 2" descr="Git na prática — Parte 1 (Subindo projeto para o github).">
             <a:extLst>
               <a:ext uri="{FF2B5EF4-FFF2-40B4-BE49-F238E27FC236}">
-                <a16:creationId xmlns:a16="http://schemas.microsoft.com/office/drawing/2014/main" id="{C41C7762-29AF-DE4A-8B75-0AA40134A4CA}"/>
+                <a16:creationId xmlns:a16="http://schemas.microsoft.com/office/drawing/2014/main" xmlns="" id="{C41C7762-29AF-DE4A-8B75-0AA40134A4CA}"/>
               </a:ext>
             </a:extLst>
           </p:cNvPr>
@@ -3828,7 +3825,7 @@
           <p:cNvPr id="6" name="TextBox 5">
             <a:extLst>
               <a:ext uri="{FF2B5EF4-FFF2-40B4-BE49-F238E27FC236}">
-                <a16:creationId xmlns:a16="http://schemas.microsoft.com/office/drawing/2014/main" id="{D5751BA7-3065-D045-A3E0-72C84756D1B7}"/>
+                <a16:creationId xmlns:a16="http://schemas.microsoft.com/office/drawing/2014/main" xmlns="" id="{D5751BA7-3065-D045-A3E0-72C84756D1B7}"/>
               </a:ext>
             </a:extLst>
           </p:cNvPr>
@@ -3956,7 +3953,7 @@
           <p:cNvPr id="6" name="TextBox 5">
             <a:extLst>
               <a:ext uri="{FF2B5EF4-FFF2-40B4-BE49-F238E27FC236}">
-                <a16:creationId xmlns:a16="http://schemas.microsoft.com/office/drawing/2014/main" id="{D5751BA7-3065-D045-A3E0-72C84756D1B7}"/>
+                <a16:creationId xmlns:a16="http://schemas.microsoft.com/office/drawing/2014/main" xmlns="" id="{D5751BA7-3065-D045-A3E0-72C84756D1B7}"/>
               </a:ext>
             </a:extLst>
           </p:cNvPr>
@@ -4065,7 +4062,7 @@
           <p:cNvPr id="6" name="TextBox 5">
             <a:extLst>
               <a:ext uri="{FF2B5EF4-FFF2-40B4-BE49-F238E27FC236}">
-                <a16:creationId xmlns:a16="http://schemas.microsoft.com/office/drawing/2014/main" id="{D5751BA7-3065-D045-A3E0-72C84756D1B7}"/>
+                <a16:creationId xmlns:a16="http://schemas.microsoft.com/office/drawing/2014/main" xmlns="" id="{D5751BA7-3065-D045-A3E0-72C84756D1B7}"/>
               </a:ext>
             </a:extLst>
           </p:cNvPr>
@@ -4203,7 +4200,7 @@
           <p:cNvPr id="6" name="TextBox 5">
             <a:extLst>
               <a:ext uri="{FF2B5EF4-FFF2-40B4-BE49-F238E27FC236}">
-                <a16:creationId xmlns:a16="http://schemas.microsoft.com/office/drawing/2014/main" id="{D5751BA7-3065-D045-A3E0-72C84756D1B7}"/>
+                <a16:creationId xmlns:a16="http://schemas.microsoft.com/office/drawing/2014/main" xmlns="" id="{D5751BA7-3065-D045-A3E0-72C84756D1B7}"/>
               </a:ext>
             </a:extLst>
           </p:cNvPr>
@@ -4411,7 +4408,7 @@
           <p:cNvPr id="6" name="TextBox 5">
             <a:extLst>
               <a:ext uri="{FF2B5EF4-FFF2-40B4-BE49-F238E27FC236}">
-                <a16:creationId xmlns:a16="http://schemas.microsoft.com/office/drawing/2014/main" id="{D5751BA7-3065-D045-A3E0-72C84756D1B7}"/>
+                <a16:creationId xmlns:a16="http://schemas.microsoft.com/office/drawing/2014/main" xmlns="" id="{D5751BA7-3065-D045-A3E0-72C84756D1B7}"/>
               </a:ext>
             </a:extLst>
           </p:cNvPr>
@@ -4538,7 +4535,7 @@
           <p:cNvPr id="6" name="TextBox 5">
             <a:extLst>
               <a:ext uri="{FF2B5EF4-FFF2-40B4-BE49-F238E27FC236}">
-                <a16:creationId xmlns:a16="http://schemas.microsoft.com/office/drawing/2014/main" id="{D5751BA7-3065-D045-A3E0-72C84756D1B7}"/>
+                <a16:creationId xmlns:a16="http://schemas.microsoft.com/office/drawing/2014/main" xmlns="" id="{D5751BA7-3065-D045-A3E0-72C84756D1B7}"/>
               </a:ext>
             </a:extLst>
           </p:cNvPr>

</xml_diff>